<commit_message>
new file:   About us/Meet Lucky.html 	new file:   About us/about.jpg 	new file:   About us/aboutstyle.css 	modified:   MP2-Proposal.pptx 	new file:   Meet Lucky.html 	new file:   aboutstyle.css 	modified:   index.html
</commit_message>
<xml_diff>
--- a/MP2-Proposal.pptx
+++ b/MP2-Proposal.pptx
@@ -117,6 +117,14 @@
 </p:presentation>
 </file>
 
+<file path=ppt/revisionInfo.xml><?xml version="1.0" encoding="utf-8"?>
+<p1510:revInfo xmlns:a="http://schemas.openxmlformats.org/drawingml/2006/main" xmlns:r="http://schemas.openxmlformats.org/officeDocument/2006/relationships" xmlns:p1510="http://schemas.microsoft.com/office/powerpoint/2015/10/main">
+  <p1510:revLst>
+    <p1510:client id="{E9E10766-F73E-4F9F-B5E8-DECD90F7B607}" v="21" dt="2023-06-20T11:27:02.172"/>
+  </p1510:revLst>
+</p1510:revInfo>
+</file>
+
 <file path=ppt/changesInfos/changesInfo1.xml><?xml version="1.0" encoding="utf-8"?>
 <pc:chgInfo xmlns:a="http://schemas.openxmlformats.org/drawingml/2006/main" xmlns:r="http://schemas.openxmlformats.org/officeDocument/2006/relationships" xmlns:ac="http://schemas.microsoft.com/office/drawing/2013/main/command" xmlns:pc="http://schemas.microsoft.com/office/powerpoint/2013/main/command">
   <pc:docChgLst>
@@ -171,6 +179,101 @@
             <ac:picMk id="46" creationId="{57BD9061-0DE7-6455-F421-0002571D5C26}"/>
           </ac:picMkLst>
         </pc:picChg>
+      </pc:sldChg>
+    </pc:docChg>
+  </pc:docChgLst>
+  <pc:docChgLst>
+    <pc:chgData name="Asher A. Federico" userId="cd7a243a-c1f3-4c9b-91c6-981eb251bbbc" providerId="ADAL" clId="{E9E10766-F73E-4F9F-B5E8-DECD90F7B607}"/>
+    <pc:docChg chg="modSld">
+      <pc:chgData name="Asher A. Federico" userId="cd7a243a-c1f3-4c9b-91c6-981eb251bbbc" providerId="ADAL" clId="{E9E10766-F73E-4F9F-B5E8-DECD90F7B607}" dt="2023-06-20T11:28:08.808" v="37" actId="20577"/>
+      <pc:docMkLst>
+        <pc:docMk/>
+      </pc:docMkLst>
+      <pc:sldChg chg="addSp modSp mod">
+        <pc:chgData name="Asher A. Federico" userId="cd7a243a-c1f3-4c9b-91c6-981eb251bbbc" providerId="ADAL" clId="{E9E10766-F73E-4F9F-B5E8-DECD90F7B607}" dt="2023-06-20T11:28:08.808" v="37" actId="20577"/>
+        <pc:sldMkLst>
+          <pc:docMk/>
+          <pc:sldMk cId="3161985567" sldId="262"/>
+        </pc:sldMkLst>
+        <pc:spChg chg="add mod">
+          <ac:chgData name="Asher A. Federico" userId="cd7a243a-c1f3-4c9b-91c6-981eb251bbbc" providerId="ADAL" clId="{E9E10766-F73E-4F9F-B5E8-DECD90F7B607}" dt="2023-06-20T11:27:21.415" v="25" actId="20577"/>
+          <ac:spMkLst>
+            <pc:docMk/>
+            <pc:sldMk cId="3161985567" sldId="262"/>
+            <ac:spMk id="4" creationId="{A8ED29C5-A058-7456-6CB4-7136BC0E5497}"/>
+          </ac:spMkLst>
+        </pc:spChg>
+        <pc:spChg chg="mod">
+          <ac:chgData name="Asher A. Federico" userId="cd7a243a-c1f3-4c9b-91c6-981eb251bbbc" providerId="ADAL" clId="{E9E10766-F73E-4F9F-B5E8-DECD90F7B607}" dt="2023-06-20T11:28:08.808" v="37" actId="20577"/>
+          <ac:spMkLst>
+            <pc:docMk/>
+            <pc:sldMk cId="3161985567" sldId="262"/>
+            <ac:spMk id="11" creationId="{0C517579-B8CC-A5BB-C978-000530451F50}"/>
+          </ac:spMkLst>
+        </pc:spChg>
+        <pc:spChg chg="mod">
+          <ac:chgData name="Asher A. Federico" userId="cd7a243a-c1f3-4c9b-91c6-981eb251bbbc" providerId="ADAL" clId="{E9E10766-F73E-4F9F-B5E8-DECD90F7B607}" dt="2023-06-20T11:27:33.191" v="33" actId="1037"/>
+          <ac:spMkLst>
+            <pc:docMk/>
+            <pc:sldMk cId="3161985567" sldId="262"/>
+            <ac:spMk id="13" creationId="{4978A612-B39D-A5CA-8FA2-129890301BB7}"/>
+          </ac:spMkLst>
+        </pc:spChg>
+        <pc:spChg chg="mod">
+          <ac:chgData name="Asher A. Federico" userId="cd7a243a-c1f3-4c9b-91c6-981eb251bbbc" providerId="ADAL" clId="{E9E10766-F73E-4F9F-B5E8-DECD90F7B607}" dt="2023-06-20T11:27:33.191" v="33" actId="1037"/>
+          <ac:spMkLst>
+            <pc:docMk/>
+            <pc:sldMk cId="3161985567" sldId="262"/>
+            <ac:spMk id="16" creationId="{C3115547-1039-276D-594C-1D9B496E23C6}"/>
+          </ac:spMkLst>
+        </pc:spChg>
+        <pc:spChg chg="mod">
+          <ac:chgData name="Asher A. Federico" userId="cd7a243a-c1f3-4c9b-91c6-981eb251bbbc" providerId="ADAL" clId="{E9E10766-F73E-4F9F-B5E8-DECD90F7B607}" dt="2023-06-20T11:27:16.868" v="21" actId="1076"/>
+          <ac:spMkLst>
+            <pc:docMk/>
+            <pc:sldMk cId="3161985567" sldId="262"/>
+            <ac:spMk id="22" creationId="{DEE00A44-5A75-39BF-7D89-88A4858BBF32}"/>
+          </ac:spMkLst>
+        </pc:spChg>
+        <pc:spChg chg="mod">
+          <ac:chgData name="Asher A. Federico" userId="cd7a243a-c1f3-4c9b-91c6-981eb251bbbc" providerId="ADAL" clId="{E9E10766-F73E-4F9F-B5E8-DECD90F7B607}" dt="2023-06-20T11:27:33.191" v="33" actId="1037"/>
+          <ac:spMkLst>
+            <pc:docMk/>
+            <pc:sldMk cId="3161985567" sldId="262"/>
+            <ac:spMk id="23" creationId="{238CF986-7FA0-F3A1-B0C3-C07CD0B3C3FE}"/>
+          </ac:spMkLst>
+        </pc:spChg>
+        <pc:spChg chg="mod">
+          <ac:chgData name="Asher A. Federico" userId="cd7a243a-c1f3-4c9b-91c6-981eb251bbbc" providerId="ADAL" clId="{E9E10766-F73E-4F9F-B5E8-DECD90F7B607}" dt="2023-06-20T11:27:33.191" v="33" actId="1037"/>
+          <ac:spMkLst>
+            <pc:docMk/>
+            <pc:sldMk cId="3161985567" sldId="262"/>
+            <ac:spMk id="27" creationId="{75861EF7-7D3E-472A-3FF8-B3706F6BA56B}"/>
+          </ac:spMkLst>
+        </pc:spChg>
+        <pc:spChg chg="mod">
+          <ac:chgData name="Asher A. Federico" userId="cd7a243a-c1f3-4c9b-91c6-981eb251bbbc" providerId="ADAL" clId="{E9E10766-F73E-4F9F-B5E8-DECD90F7B607}" dt="2023-06-20T11:27:33.191" v="33" actId="1037"/>
+          <ac:spMkLst>
+            <pc:docMk/>
+            <pc:sldMk cId="3161985567" sldId="262"/>
+            <ac:spMk id="57" creationId="{9519A7AE-BC24-6C9D-69E0-6C14DED43348}"/>
+          </ac:spMkLst>
+        </pc:spChg>
+      </pc:sldChg>
+      <pc:sldChg chg="modSp">
+        <pc:chgData name="Asher A. Federico" userId="cd7a243a-c1f3-4c9b-91c6-981eb251bbbc" providerId="ADAL" clId="{E9E10766-F73E-4F9F-B5E8-DECD90F7B607}" dt="2023-06-20T11:17:54.123" v="18" actId="478"/>
+        <pc:sldMkLst>
+          <pc:docMk/>
+          <pc:sldMk cId="3925645252" sldId="267"/>
+        </pc:sldMkLst>
+        <pc:graphicFrameChg chg="mod">
+          <ac:chgData name="Asher A. Federico" userId="cd7a243a-c1f3-4c9b-91c6-981eb251bbbc" providerId="ADAL" clId="{E9E10766-F73E-4F9F-B5E8-DECD90F7B607}" dt="2023-06-20T11:17:54.123" v="18" actId="478"/>
+          <ac:graphicFrameMkLst>
+            <pc:docMk/>
+            <pc:sldMk cId="3925645252" sldId="267"/>
+            <ac:graphicFrameMk id="44" creationId="{5D76E7EC-E367-711A-089F-823D241D775F}"/>
+          </ac:graphicFrameMkLst>
+        </pc:graphicFrameChg>
       </pc:sldChg>
     </pc:docChg>
   </pc:docChgLst>
@@ -1797,7 +1900,7 @@
         <a:p>
           <a:r>
             <a:rPr lang="en-US" sz="1200" dirty="0"/>
-            <a:t>Meet Lucky</a:t>
+            <a:t>About</a:t>
           </a:r>
           <a:endParaRPr lang="en-PH" sz="1200" dirty="0"/>
         </a:p>
@@ -1872,56 +1975,6 @@
         <a:lstStyle/>
         <a:p>
           <a:endParaRPr lang="en-PH" sz="1200"/>
-        </a:p>
-      </dgm:t>
-    </dgm:pt>
-    <dgm:pt modelId="{56EA6BB8-FB46-41EE-BE2A-5BDA4733612D}">
-      <dgm:prSet custT="1"/>
-      <dgm:spPr>
-        <a:ln>
-          <a:solidFill>
-            <a:srgbClr val="1F497D"/>
-          </a:solidFill>
-        </a:ln>
-        <a:effectLst>
-          <a:outerShdw blurRad="50800" dist="38100" dir="10800000" algn="r" rotWithShape="0">
-            <a:prstClr val="black">
-              <a:alpha val="40000"/>
-            </a:prstClr>
-          </a:outerShdw>
-        </a:effectLst>
-      </dgm:spPr>
-      <dgm:t>
-        <a:bodyPr/>
-        <a:lstStyle/>
-        <a:p>
-          <a:r>
-            <a:rPr lang="en-US" sz="1200" dirty="0"/>
-            <a:t>Privacy Disclosure</a:t>
-          </a:r>
-          <a:endParaRPr lang="en-PH" sz="1200" dirty="0"/>
-        </a:p>
-      </dgm:t>
-    </dgm:pt>
-    <dgm:pt modelId="{D9EA5FAE-CE1E-49FB-B216-2A08A8949BF1}" type="sibTrans" cxnId="{4954AFC7-19A5-4295-BD38-DC205BF066BD}">
-      <dgm:prSet/>
-      <dgm:spPr/>
-      <dgm:t>
-        <a:bodyPr/>
-        <a:lstStyle/>
-        <a:p>
-          <a:endParaRPr lang="en-PH"/>
-        </a:p>
-      </dgm:t>
-    </dgm:pt>
-    <dgm:pt modelId="{5B0E6DDA-0F05-4A5F-9B61-0D9BBCEE9FDA}" type="parTrans" cxnId="{4954AFC7-19A5-4295-BD38-DC205BF066BD}">
-      <dgm:prSet/>
-      <dgm:spPr/>
-      <dgm:t>
-        <a:bodyPr/>
-        <a:lstStyle/>
-        <a:p>
-          <a:endParaRPr lang="en-PH"/>
         </a:p>
       </dgm:t>
     </dgm:pt>
@@ -2055,124 +2108,6 @@
         </a:p>
       </dgm:t>
     </dgm:pt>
-    <dgm:pt modelId="{77AF0B6E-BD97-4C8F-AF92-5BA948A731BD}">
-      <dgm:prSet custT="1"/>
-      <dgm:spPr>
-        <a:gradFill rotWithShape="0">
-          <a:gsLst>
-            <a:gs pos="25000">
-              <a:prstClr val="white">
-                <a:hueOff val="0"/>
-                <a:satOff val="0"/>
-                <a:lumOff val="0"/>
-                <a:alphaOff val="0"/>
-                <a:tint val="65000"/>
-                <a:shade val="92000"/>
-                <a:satMod val="130000"/>
-              </a:prstClr>
-            </a:gs>
-            <a:gs pos="45000">
-              <a:prstClr val="white">
-                <a:hueOff val="0"/>
-                <a:satOff val="0"/>
-                <a:lumOff val="0"/>
-                <a:alphaOff val="0"/>
-                <a:tint val="60000"/>
-                <a:shade val="99000"/>
-                <a:satMod val="120000"/>
-              </a:prstClr>
-            </a:gs>
-            <a:gs pos="100000">
-              <a:prstClr val="white">
-                <a:hueOff val="0"/>
-                <a:satOff val="0"/>
-                <a:lumOff val="0"/>
-                <a:alphaOff val="0"/>
-                <a:tint val="55000"/>
-                <a:satMod val="140000"/>
-              </a:prstClr>
-            </a:gs>
-          </a:gsLst>
-          <a:lin ang="5400000" scaled="0"/>
-        </a:gradFill>
-        <a:ln>
-          <a:solidFill>
-            <a:srgbClr val="1F497D"/>
-          </a:solidFill>
-        </a:ln>
-        <a:effectLst>
-          <a:outerShdw blurRad="50800" dist="38100" dir="5400000" algn="t" rotWithShape="0">
-            <a:prstClr val="black">
-              <a:alpha val="40000"/>
-            </a:prstClr>
-          </a:outerShdw>
-        </a:effectLst>
-        <a:scene3d>
-          <a:camera prst="orthographicFront"/>
-          <a:lightRig rig="flat" dir="t"/>
-        </a:scene3d>
-        <a:sp3d prstMaterial="dkEdge">
-          <a:bevelT w="8200" h="38100"/>
-        </a:sp3d>
-      </dgm:spPr>
-      <dgm:t>
-        <a:bodyPr spcFirstLastPara="0" vert="horz" wrap="square" lIns="8890" tIns="8890" rIns="8890" bIns="8890" numCol="1" spcCol="1270" anchor="ctr" anchorCtr="0"/>
-        <a:lstStyle/>
-        <a:p>
-          <a:r>
-            <a:rPr lang="en-US" sz="1400" b="0" kern="1200" dirty="0">
-              <a:solidFill>
-                <a:srgbClr val="44546A">
-                  <a:hueOff val="0"/>
-                  <a:satOff val="0"/>
-                  <a:lumOff val="0"/>
-                  <a:alphaOff val="0"/>
-                </a:srgbClr>
-              </a:solidFill>
-              <a:latin typeface="Calibri" panose="020F0502020204030204"/>
-              <a:ea typeface="+mn-ea"/>
-              <a:cs typeface="+mn-cs"/>
-            </a:rPr>
-            <a:t>All Recipes</a:t>
-          </a:r>
-          <a:endParaRPr lang="en-PH" sz="1400" b="0" kern="1200" dirty="0">
-            <a:solidFill>
-              <a:srgbClr val="44546A">
-                <a:hueOff val="0"/>
-                <a:satOff val="0"/>
-                <a:lumOff val="0"/>
-                <a:alphaOff val="0"/>
-              </a:srgbClr>
-            </a:solidFill>
-            <a:latin typeface="Calibri" panose="020F0502020204030204"/>
-            <a:ea typeface="+mn-ea"/>
-            <a:cs typeface="+mn-cs"/>
-          </a:endParaRPr>
-        </a:p>
-      </dgm:t>
-    </dgm:pt>
-    <dgm:pt modelId="{790D96E9-46AF-4A3B-A2D3-A6B0E4575C26}" type="parTrans" cxnId="{C3E199F0-0A4C-431C-81FD-8FF0DEA1FBB1}">
-      <dgm:prSet/>
-      <dgm:spPr/>
-      <dgm:t>
-        <a:bodyPr/>
-        <a:lstStyle/>
-        <a:p>
-          <a:endParaRPr lang="en-PH"/>
-        </a:p>
-      </dgm:t>
-    </dgm:pt>
-    <dgm:pt modelId="{E4E1D852-AB88-48CF-9022-06C505511263}" type="sibTrans" cxnId="{C3E199F0-0A4C-431C-81FD-8FF0DEA1FBB1}">
-      <dgm:prSet/>
-      <dgm:spPr/>
-      <dgm:t>
-        <a:bodyPr/>
-        <a:lstStyle/>
-        <a:p>
-          <a:endParaRPr lang="en-PH"/>
-        </a:p>
-      </dgm:t>
-    </dgm:pt>
     <dgm:pt modelId="{16A0762F-2B65-431A-BB38-8A45163690DE}">
       <dgm:prSet custT="1"/>
       <dgm:spPr>
@@ -2687,7 +2622,7 @@
       <dgm:spPr/>
     </dgm:pt>
     <dgm:pt modelId="{CD8C52B1-0275-4306-8873-659681018C36}" type="pres">
-      <dgm:prSet presAssocID="{355621C0-62E3-4188-9461-E7708E24A937}" presName="Name37" presStyleLbl="parChTrans1D2" presStyleIdx="0" presStyleCnt="9"/>
+      <dgm:prSet presAssocID="{355621C0-62E3-4188-9461-E7708E24A937}" presName="Name37" presStyleLbl="parChTrans1D2" presStyleIdx="0" presStyleCnt="8"/>
       <dgm:spPr/>
     </dgm:pt>
     <dgm:pt modelId="{0B96F10A-B364-45F4-B6F3-5B295EACF5CE}" type="pres">
@@ -2703,7 +2638,7 @@
       <dgm:spPr/>
     </dgm:pt>
     <dgm:pt modelId="{035F586F-77DB-4363-B3F5-5DA36B444564}" type="pres">
-      <dgm:prSet presAssocID="{A778A49F-FE84-4B34-89B6-E8A045B700F2}" presName="rootText" presStyleLbl="node2" presStyleIdx="0" presStyleCnt="9" custScaleX="156856" custLinFactNeighborX="1354">
+      <dgm:prSet presAssocID="{A778A49F-FE84-4B34-89B6-E8A045B700F2}" presName="rootText" presStyleLbl="node2" presStyleIdx="0" presStyleCnt="8" custScaleX="156856" custLinFactNeighborX="1354">
         <dgm:presLayoutVars>
           <dgm:chPref val="3"/>
         </dgm:presLayoutVars>
@@ -2715,7 +2650,7 @@
       </dgm:spPr>
     </dgm:pt>
     <dgm:pt modelId="{0D2CACAD-D4F2-456A-A6EE-B6D9FB67F59C}" type="pres">
-      <dgm:prSet presAssocID="{A778A49F-FE84-4B34-89B6-E8A045B700F2}" presName="rootConnector" presStyleLbl="node2" presStyleIdx="0" presStyleCnt="9"/>
+      <dgm:prSet presAssocID="{A778A49F-FE84-4B34-89B6-E8A045B700F2}" presName="rootConnector" presStyleLbl="node2" presStyleIdx="0" presStyleCnt="8"/>
       <dgm:spPr/>
     </dgm:pt>
     <dgm:pt modelId="{920745DA-C2F8-444E-93C9-5AFD0B2FC67B}" type="pres">
@@ -2723,7 +2658,7 @@
       <dgm:spPr/>
     </dgm:pt>
     <dgm:pt modelId="{895F91D1-E63A-4510-A4DA-3DF8F39D8645}" type="pres">
-      <dgm:prSet presAssocID="{D48A2EFD-E369-43D7-8DD8-9C2D2CC910CC}" presName="Name37" presStyleLbl="parChTrans1D3" presStyleIdx="0" presStyleCnt="11"/>
+      <dgm:prSet presAssocID="{D48A2EFD-E369-43D7-8DD8-9C2D2CC910CC}" presName="Name37" presStyleLbl="parChTrans1D3" presStyleIdx="0" presStyleCnt="10"/>
       <dgm:spPr/>
     </dgm:pt>
     <dgm:pt modelId="{2C069DE4-F0ED-4289-B21F-B4157948C961}" type="pres">
@@ -2739,7 +2674,7 @@
       <dgm:spPr/>
     </dgm:pt>
     <dgm:pt modelId="{4AE6D973-2408-4A99-8977-97432C80BC26}" type="pres">
-      <dgm:prSet presAssocID="{5D37E786-0631-48CD-B528-DEE4EED251A4}" presName="rootText" presStyleLbl="node3" presStyleIdx="0" presStyleCnt="11" custLinFactNeighborX="-2797" custLinFactNeighborY="2574">
+      <dgm:prSet presAssocID="{5D37E786-0631-48CD-B528-DEE4EED251A4}" presName="rootText" presStyleLbl="node3" presStyleIdx="0" presStyleCnt="10" custLinFactNeighborX="-2797" custLinFactNeighborY="2574">
         <dgm:presLayoutVars>
           <dgm:chPref val="3"/>
         </dgm:presLayoutVars>
@@ -2747,7 +2682,7 @@
       <dgm:spPr/>
     </dgm:pt>
     <dgm:pt modelId="{507D611A-77D6-4DB9-ABC3-9BC8D55A5B4E}" type="pres">
-      <dgm:prSet presAssocID="{5D37E786-0631-48CD-B528-DEE4EED251A4}" presName="rootConnector" presStyleLbl="node3" presStyleIdx="0" presStyleCnt="11"/>
+      <dgm:prSet presAssocID="{5D37E786-0631-48CD-B528-DEE4EED251A4}" presName="rootConnector" presStyleLbl="node3" presStyleIdx="0" presStyleCnt="10"/>
       <dgm:spPr/>
     </dgm:pt>
     <dgm:pt modelId="{4659DE43-1A5E-464B-97BE-9307D7F0CB07}" type="pres">
@@ -2759,7 +2694,7 @@
       <dgm:spPr/>
     </dgm:pt>
     <dgm:pt modelId="{CE389DA5-3827-44AC-98CB-FDD6906625BA}" type="pres">
-      <dgm:prSet presAssocID="{0F4E0B57-0F30-404F-A40B-B0F498924B71}" presName="Name37" presStyleLbl="parChTrans1D3" presStyleIdx="1" presStyleCnt="11"/>
+      <dgm:prSet presAssocID="{0F4E0B57-0F30-404F-A40B-B0F498924B71}" presName="Name37" presStyleLbl="parChTrans1D3" presStyleIdx="1" presStyleCnt="10"/>
       <dgm:spPr/>
     </dgm:pt>
     <dgm:pt modelId="{FA46046B-0D3C-4276-BABA-121B09A855C5}" type="pres">
@@ -2775,7 +2710,7 @@
       <dgm:spPr/>
     </dgm:pt>
     <dgm:pt modelId="{29FBCDE1-AB17-4BD8-BDA9-BED1B69B4924}" type="pres">
-      <dgm:prSet presAssocID="{4A39742E-1493-4DCE-955B-B9A44E2FF975}" presName="rootText" presStyleLbl="node3" presStyleIdx="1" presStyleCnt="11" custLinFactNeighborX="-2797" custLinFactNeighborY="2574">
+      <dgm:prSet presAssocID="{4A39742E-1493-4DCE-955B-B9A44E2FF975}" presName="rootText" presStyleLbl="node3" presStyleIdx="1" presStyleCnt="10" custLinFactNeighborX="-2797" custLinFactNeighborY="2574">
         <dgm:presLayoutVars>
           <dgm:chPref val="3"/>
         </dgm:presLayoutVars>
@@ -2783,7 +2718,7 @@
       <dgm:spPr/>
     </dgm:pt>
     <dgm:pt modelId="{41BF01D8-AA37-4E51-928B-CDFF5CAE6697}" type="pres">
-      <dgm:prSet presAssocID="{4A39742E-1493-4DCE-955B-B9A44E2FF975}" presName="rootConnector" presStyleLbl="node3" presStyleIdx="1" presStyleCnt="11"/>
+      <dgm:prSet presAssocID="{4A39742E-1493-4DCE-955B-B9A44E2FF975}" presName="rootConnector" presStyleLbl="node3" presStyleIdx="1" presStyleCnt="10"/>
       <dgm:spPr/>
     </dgm:pt>
     <dgm:pt modelId="{1F743FC4-8B95-4C39-AAC3-C59332912648}" type="pres">
@@ -2795,7 +2730,7 @@
       <dgm:spPr/>
     </dgm:pt>
     <dgm:pt modelId="{2244FC6E-6986-4E70-ADA5-D20EF7188AE4}" type="pres">
-      <dgm:prSet presAssocID="{9C138485-B523-4E4F-ACF2-E35232DC907E}" presName="Name37" presStyleLbl="parChTrans1D3" presStyleIdx="2" presStyleCnt="11"/>
+      <dgm:prSet presAssocID="{9C138485-B523-4E4F-ACF2-E35232DC907E}" presName="Name37" presStyleLbl="parChTrans1D3" presStyleIdx="2" presStyleCnt="10"/>
       <dgm:spPr/>
     </dgm:pt>
     <dgm:pt modelId="{0E153EFB-5D76-440B-B6A8-8D4A13612C71}" type="pres">
@@ -2811,7 +2746,7 @@
       <dgm:spPr/>
     </dgm:pt>
     <dgm:pt modelId="{17DBEF4E-9197-4AFC-8B80-47C4CA356FD3}" type="pres">
-      <dgm:prSet presAssocID="{DDFD1914-59A4-4644-A4F0-79CB5B0619EF}" presName="rootText" presStyleLbl="node3" presStyleIdx="2" presStyleCnt="11" custLinFactNeighborX="-2797" custLinFactNeighborY="1287">
+      <dgm:prSet presAssocID="{DDFD1914-59A4-4644-A4F0-79CB5B0619EF}" presName="rootText" presStyleLbl="node3" presStyleIdx="2" presStyleCnt="10" custLinFactNeighborX="-2797" custLinFactNeighborY="1287">
         <dgm:presLayoutVars>
           <dgm:chPref val="3"/>
         </dgm:presLayoutVars>
@@ -2819,7 +2754,7 @@
       <dgm:spPr/>
     </dgm:pt>
     <dgm:pt modelId="{DAD40E46-1AE9-45B6-A895-1C40B19C30D4}" type="pres">
-      <dgm:prSet presAssocID="{DDFD1914-59A4-4644-A4F0-79CB5B0619EF}" presName="rootConnector" presStyleLbl="node3" presStyleIdx="2" presStyleCnt="11"/>
+      <dgm:prSet presAssocID="{DDFD1914-59A4-4644-A4F0-79CB5B0619EF}" presName="rootConnector" presStyleLbl="node3" presStyleIdx="2" presStyleCnt="10"/>
       <dgm:spPr/>
     </dgm:pt>
     <dgm:pt modelId="{25D60D85-68CD-4FB6-B167-5B658CA94891}" type="pres">
@@ -2835,7 +2770,7 @@
       <dgm:spPr/>
     </dgm:pt>
     <dgm:pt modelId="{1C395FA0-903A-4395-9EBE-C5F8426C9FA2}" type="pres">
-      <dgm:prSet presAssocID="{B54B09A1-4CFE-4869-9C1A-390E4640E116}" presName="Name37" presStyleLbl="parChTrans1D2" presStyleIdx="1" presStyleCnt="9"/>
+      <dgm:prSet presAssocID="{B54B09A1-4CFE-4869-9C1A-390E4640E116}" presName="Name37" presStyleLbl="parChTrans1D2" presStyleIdx="1" presStyleCnt="8"/>
       <dgm:spPr/>
     </dgm:pt>
     <dgm:pt modelId="{70FCEA70-D7B2-41E5-8D6D-3829EB2E88A8}" type="pres">
@@ -2851,7 +2786,7 @@
       <dgm:spPr/>
     </dgm:pt>
     <dgm:pt modelId="{56F768EC-FEA2-49DF-A1F5-6EAB512383A2}" type="pres">
-      <dgm:prSet presAssocID="{C2C95360-4E0F-4BAE-92E7-C888B269E4D1}" presName="rootText" presStyleLbl="node2" presStyleIdx="1" presStyleCnt="9" custScaleX="153427" custLinFactNeighborX="0">
+      <dgm:prSet presAssocID="{C2C95360-4E0F-4BAE-92E7-C888B269E4D1}" presName="rootText" presStyleLbl="node2" presStyleIdx="1" presStyleCnt="8" custScaleX="153427" custLinFactNeighborX="0">
         <dgm:presLayoutVars>
           <dgm:chPref val="3"/>
         </dgm:presLayoutVars>
@@ -2863,7 +2798,7 @@
       </dgm:spPr>
     </dgm:pt>
     <dgm:pt modelId="{6AFDF369-C7C5-49F9-814F-BA87F2D8D4FA}" type="pres">
-      <dgm:prSet presAssocID="{C2C95360-4E0F-4BAE-92E7-C888B269E4D1}" presName="rootConnector" presStyleLbl="node2" presStyleIdx="1" presStyleCnt="9"/>
+      <dgm:prSet presAssocID="{C2C95360-4E0F-4BAE-92E7-C888B269E4D1}" presName="rootConnector" presStyleLbl="node2" presStyleIdx="1" presStyleCnt="8"/>
       <dgm:spPr/>
     </dgm:pt>
     <dgm:pt modelId="{F034B8F3-1E62-4902-BEBC-F1553EEEA750}" type="pres">
@@ -2871,7 +2806,7 @@
       <dgm:spPr/>
     </dgm:pt>
     <dgm:pt modelId="{6DB89535-9ED7-4C60-B813-D422E81AC957}" type="pres">
-      <dgm:prSet presAssocID="{8F940151-574B-495C-8582-AEC8DBEB8FC3}" presName="Name37" presStyleLbl="parChTrans1D3" presStyleIdx="3" presStyleCnt="11"/>
+      <dgm:prSet presAssocID="{8F940151-574B-495C-8582-AEC8DBEB8FC3}" presName="Name37" presStyleLbl="parChTrans1D3" presStyleIdx="3" presStyleCnt="10"/>
       <dgm:spPr/>
     </dgm:pt>
     <dgm:pt modelId="{EBDBC3F2-E765-41B3-8FF2-C598D74EA97D}" type="pres">
@@ -2887,7 +2822,7 @@
       <dgm:spPr/>
     </dgm:pt>
     <dgm:pt modelId="{EB179761-8B3B-4EB9-9EA1-D84BC7D38023}" type="pres">
-      <dgm:prSet presAssocID="{1B253C7D-EB20-477C-AEE4-C78EC91813A0}" presName="rootText" presStyleLbl="node3" presStyleIdx="3" presStyleCnt="11" custLinFactNeighborX="-2797" custLinFactNeighborY="1287">
+      <dgm:prSet presAssocID="{1B253C7D-EB20-477C-AEE4-C78EC91813A0}" presName="rootText" presStyleLbl="node3" presStyleIdx="3" presStyleCnt="10" custLinFactNeighborX="-2797" custLinFactNeighborY="1287">
         <dgm:presLayoutVars>
           <dgm:chPref val="3"/>
         </dgm:presLayoutVars>
@@ -2895,7 +2830,7 @@
       <dgm:spPr/>
     </dgm:pt>
     <dgm:pt modelId="{24C8DD71-B5AF-41E8-BF80-2803D28A1A5F}" type="pres">
-      <dgm:prSet presAssocID="{1B253C7D-EB20-477C-AEE4-C78EC91813A0}" presName="rootConnector" presStyleLbl="node3" presStyleIdx="3" presStyleCnt="11"/>
+      <dgm:prSet presAssocID="{1B253C7D-EB20-477C-AEE4-C78EC91813A0}" presName="rootConnector" presStyleLbl="node3" presStyleIdx="3" presStyleCnt="10"/>
       <dgm:spPr/>
     </dgm:pt>
     <dgm:pt modelId="{AFED6431-03C7-4C03-87AB-9DEF3B536AE5}" type="pres">
@@ -2907,7 +2842,7 @@
       <dgm:spPr/>
     </dgm:pt>
     <dgm:pt modelId="{BED080A5-0EB9-475E-BB32-254D8B47DAA3}" type="pres">
-      <dgm:prSet presAssocID="{5A73290C-8330-4E7A-8389-501F591DF3CA}" presName="Name37" presStyleLbl="parChTrans1D3" presStyleIdx="4" presStyleCnt="11"/>
+      <dgm:prSet presAssocID="{5A73290C-8330-4E7A-8389-501F591DF3CA}" presName="Name37" presStyleLbl="parChTrans1D3" presStyleIdx="4" presStyleCnt="10"/>
       <dgm:spPr/>
     </dgm:pt>
     <dgm:pt modelId="{397F8B10-3B32-4834-93FC-3306E4878138}" type="pres">
@@ -2923,7 +2858,7 @@
       <dgm:spPr/>
     </dgm:pt>
     <dgm:pt modelId="{B3039094-0E85-440F-8060-B13F2AFB1B44}" type="pres">
-      <dgm:prSet presAssocID="{B33F8F8B-9529-4776-AA67-AB17FA92F5F2}" presName="rootText" presStyleLbl="node3" presStyleIdx="4" presStyleCnt="11" custLinFactNeighborX="-1839" custLinFactNeighborY="9158">
+      <dgm:prSet presAssocID="{B33F8F8B-9529-4776-AA67-AB17FA92F5F2}" presName="rootText" presStyleLbl="node3" presStyleIdx="4" presStyleCnt="10" custLinFactNeighborX="-1839" custLinFactNeighborY="9158">
         <dgm:presLayoutVars>
           <dgm:chPref val="3"/>
         </dgm:presLayoutVars>
@@ -2931,7 +2866,7 @@
       <dgm:spPr/>
     </dgm:pt>
     <dgm:pt modelId="{2E8FA3E2-A375-4926-A853-AF9A7D0DE5F5}" type="pres">
-      <dgm:prSet presAssocID="{B33F8F8B-9529-4776-AA67-AB17FA92F5F2}" presName="rootConnector" presStyleLbl="node3" presStyleIdx="4" presStyleCnt="11"/>
+      <dgm:prSet presAssocID="{B33F8F8B-9529-4776-AA67-AB17FA92F5F2}" presName="rootConnector" presStyleLbl="node3" presStyleIdx="4" presStyleCnt="10"/>
       <dgm:spPr/>
     </dgm:pt>
     <dgm:pt modelId="{DC6DC33A-998E-434D-9556-7A642B26E69D}" type="pres">
@@ -2943,7 +2878,7 @@
       <dgm:spPr/>
     </dgm:pt>
     <dgm:pt modelId="{504D1EB5-4E3B-41E0-B0ED-3F607A709605}" type="pres">
-      <dgm:prSet presAssocID="{3A71B239-AE46-48BA-852B-CD13632D0C2C}" presName="Name37" presStyleLbl="parChTrans1D3" presStyleIdx="5" presStyleCnt="11"/>
+      <dgm:prSet presAssocID="{3A71B239-AE46-48BA-852B-CD13632D0C2C}" presName="Name37" presStyleLbl="parChTrans1D3" presStyleIdx="5" presStyleCnt="10"/>
       <dgm:spPr/>
     </dgm:pt>
     <dgm:pt modelId="{98878224-E787-4D7E-9586-FF471F56B3FE}" type="pres">
@@ -2959,7 +2894,7 @@
       <dgm:spPr/>
     </dgm:pt>
     <dgm:pt modelId="{EA31EAA2-8FD1-48BE-AD0D-DD4F42FDC50A}" type="pres">
-      <dgm:prSet presAssocID="{56E4E874-A403-4372-8362-3C5B550269EB}" presName="rootText" presStyleLbl="node3" presStyleIdx="5" presStyleCnt="11" custLinFactNeighborX="-2797" custLinFactNeighborY="1287">
+      <dgm:prSet presAssocID="{56E4E874-A403-4372-8362-3C5B550269EB}" presName="rootText" presStyleLbl="node3" presStyleIdx="5" presStyleCnt="10" custLinFactNeighborX="-2797" custLinFactNeighborY="1287">
         <dgm:presLayoutVars>
           <dgm:chPref val="3"/>
         </dgm:presLayoutVars>
@@ -2967,7 +2902,7 @@
       <dgm:spPr/>
     </dgm:pt>
     <dgm:pt modelId="{6092F6C3-6B05-47CF-BE92-FD65EBAAB336}" type="pres">
-      <dgm:prSet presAssocID="{56E4E874-A403-4372-8362-3C5B550269EB}" presName="rootConnector" presStyleLbl="node3" presStyleIdx="5" presStyleCnt="11"/>
+      <dgm:prSet presAssocID="{56E4E874-A403-4372-8362-3C5B550269EB}" presName="rootConnector" presStyleLbl="node3" presStyleIdx="5" presStyleCnt="10"/>
       <dgm:spPr/>
     </dgm:pt>
     <dgm:pt modelId="{D4260CF8-8E8C-4285-95DB-5AD166AC0E3B}" type="pres">
@@ -2979,7 +2914,7 @@
       <dgm:spPr/>
     </dgm:pt>
     <dgm:pt modelId="{AC0E87A5-89D2-4F91-B027-830D1EB3770A}" type="pres">
-      <dgm:prSet presAssocID="{9E381D48-0530-4880-A5EC-4F22EC87DFD1}" presName="Name37" presStyleLbl="parChTrans1D3" presStyleIdx="6" presStyleCnt="11"/>
+      <dgm:prSet presAssocID="{9E381D48-0530-4880-A5EC-4F22EC87DFD1}" presName="Name37" presStyleLbl="parChTrans1D3" presStyleIdx="6" presStyleCnt="10"/>
       <dgm:spPr/>
     </dgm:pt>
     <dgm:pt modelId="{90420574-ADA9-456C-BC95-C19AA7210A02}" type="pres">
@@ -2995,7 +2930,7 @@
       <dgm:spPr/>
     </dgm:pt>
     <dgm:pt modelId="{ADCD2133-654C-430B-93BA-F3A8CCB4ACEF}" type="pres">
-      <dgm:prSet presAssocID="{8873C710-6C9D-49CA-A82F-CA6366DBC195}" presName="rootText" presStyleLbl="node3" presStyleIdx="6" presStyleCnt="11" custLinFactNeighborY="1287">
+      <dgm:prSet presAssocID="{8873C710-6C9D-49CA-A82F-CA6366DBC195}" presName="rootText" presStyleLbl="node3" presStyleIdx="6" presStyleCnt="10" custLinFactNeighborY="1287">
         <dgm:presLayoutVars>
           <dgm:chPref val="3"/>
         </dgm:presLayoutVars>
@@ -3003,7 +2938,7 @@
       <dgm:spPr/>
     </dgm:pt>
     <dgm:pt modelId="{C72BAC93-FBFD-4E31-A280-E636FF5744DE}" type="pres">
-      <dgm:prSet presAssocID="{8873C710-6C9D-49CA-A82F-CA6366DBC195}" presName="rootConnector" presStyleLbl="node3" presStyleIdx="6" presStyleCnt="11"/>
+      <dgm:prSet presAssocID="{8873C710-6C9D-49CA-A82F-CA6366DBC195}" presName="rootConnector" presStyleLbl="node3" presStyleIdx="6" presStyleCnt="10"/>
       <dgm:spPr/>
     </dgm:pt>
     <dgm:pt modelId="{A79D1E18-493E-49B7-AA95-7523DF64DE7C}" type="pres">
@@ -3015,7 +2950,7 @@
       <dgm:spPr/>
     </dgm:pt>
     <dgm:pt modelId="{E0999DEB-DFC8-4943-A105-F4F46072C549}" type="pres">
-      <dgm:prSet presAssocID="{AE11A560-868D-432A-B204-67149B05C9CD}" presName="Name37" presStyleLbl="parChTrans1D3" presStyleIdx="7" presStyleCnt="11"/>
+      <dgm:prSet presAssocID="{AE11A560-868D-432A-B204-67149B05C9CD}" presName="Name37" presStyleLbl="parChTrans1D3" presStyleIdx="7" presStyleCnt="10"/>
       <dgm:spPr/>
     </dgm:pt>
     <dgm:pt modelId="{3662E62B-BD00-409E-8AB7-D667ECFE4896}" type="pres">
@@ -3031,7 +2966,7 @@
       <dgm:spPr/>
     </dgm:pt>
     <dgm:pt modelId="{2CFF089F-5388-4C22-B30C-4ABD6B9349AD}" type="pres">
-      <dgm:prSet presAssocID="{CE36DE27-0DEA-41DE-BBC2-304F8A895969}" presName="rootText" presStyleLbl="node3" presStyleIdx="7" presStyleCnt="11" custLinFactNeighborY="1287">
+      <dgm:prSet presAssocID="{CE36DE27-0DEA-41DE-BBC2-304F8A895969}" presName="rootText" presStyleLbl="node3" presStyleIdx="7" presStyleCnt="10" custLinFactNeighborY="1287">
         <dgm:presLayoutVars>
           <dgm:chPref val="3"/>
         </dgm:presLayoutVars>
@@ -3039,7 +2974,7 @@
       <dgm:spPr/>
     </dgm:pt>
     <dgm:pt modelId="{A4526223-F200-4B5A-B974-2310A876DD3B}" type="pres">
-      <dgm:prSet presAssocID="{CE36DE27-0DEA-41DE-BBC2-304F8A895969}" presName="rootConnector" presStyleLbl="node3" presStyleIdx="7" presStyleCnt="11"/>
+      <dgm:prSet presAssocID="{CE36DE27-0DEA-41DE-BBC2-304F8A895969}" presName="rootConnector" presStyleLbl="node3" presStyleIdx="7" presStyleCnt="10"/>
       <dgm:spPr/>
     </dgm:pt>
     <dgm:pt modelId="{29906AE5-B64E-476B-92B1-D70C85D753E5}" type="pres">
@@ -3054,52 +2989,8 @@
       <dgm:prSet presAssocID="{C2C95360-4E0F-4BAE-92E7-C888B269E4D1}" presName="hierChild5" presStyleCnt="0"/>
       <dgm:spPr/>
     </dgm:pt>
-    <dgm:pt modelId="{ADFD04E9-E27B-43C8-B910-7FB1EC572950}" type="pres">
-      <dgm:prSet presAssocID="{790D96E9-46AF-4A3B-A2D3-A6B0E4575C26}" presName="Name37" presStyleLbl="parChTrans1D2" presStyleIdx="2" presStyleCnt="9"/>
-      <dgm:spPr/>
-    </dgm:pt>
-    <dgm:pt modelId="{9A360762-127E-4CC8-B3A9-4BDEDB8E4B71}" type="pres">
-      <dgm:prSet presAssocID="{77AF0B6E-BD97-4C8F-AF92-5BA948A731BD}" presName="hierRoot2" presStyleCnt="0">
-        <dgm:presLayoutVars>
-          <dgm:hierBranch val="init"/>
-        </dgm:presLayoutVars>
-      </dgm:prSet>
-      <dgm:spPr/>
-    </dgm:pt>
-    <dgm:pt modelId="{D469E816-524C-4199-A11C-6330429ABA4C}" type="pres">
-      <dgm:prSet presAssocID="{77AF0B6E-BD97-4C8F-AF92-5BA948A731BD}" presName="rootComposite" presStyleCnt="0"/>
-      <dgm:spPr/>
-    </dgm:pt>
-    <dgm:pt modelId="{8BA562D8-DC7C-424D-9797-DD3F3C147DA2}" type="pres">
-      <dgm:prSet presAssocID="{77AF0B6E-BD97-4C8F-AF92-5BA948A731BD}" presName="rootText" presStyleLbl="node2" presStyleIdx="2" presStyleCnt="9">
-        <dgm:presLayoutVars>
-          <dgm:chPref val="3"/>
-        </dgm:presLayoutVars>
-      </dgm:prSet>
-      <dgm:spPr>
-        <a:xfrm>
-          <a:off x="2898905" y="1237270"/>
-          <a:ext cx="822459" cy="411229"/>
-        </a:xfrm>
-        <a:prstGeom prst="rect">
-          <a:avLst/>
-        </a:prstGeom>
-      </dgm:spPr>
-    </dgm:pt>
-    <dgm:pt modelId="{9C05F8D8-C192-487B-A4F5-E74AB9FAD369}" type="pres">
-      <dgm:prSet presAssocID="{77AF0B6E-BD97-4C8F-AF92-5BA948A731BD}" presName="rootConnector" presStyleLbl="node2" presStyleIdx="2" presStyleCnt="9"/>
-      <dgm:spPr/>
-    </dgm:pt>
-    <dgm:pt modelId="{642E2F6D-2B77-44BE-A1FA-FB1A525D4C7A}" type="pres">
-      <dgm:prSet presAssocID="{77AF0B6E-BD97-4C8F-AF92-5BA948A731BD}" presName="hierChild4" presStyleCnt="0"/>
-      <dgm:spPr/>
-    </dgm:pt>
-    <dgm:pt modelId="{86482EF9-4C45-40B2-81E0-DC75C1223578}" type="pres">
-      <dgm:prSet presAssocID="{77AF0B6E-BD97-4C8F-AF92-5BA948A731BD}" presName="hierChild5" presStyleCnt="0"/>
-      <dgm:spPr/>
-    </dgm:pt>
     <dgm:pt modelId="{F77C2B19-2A94-47E3-8D6C-EBC149703009}" type="pres">
-      <dgm:prSet presAssocID="{5A811E75-3DD0-44DD-9BCC-F92EFF5ABDF7}" presName="Name37" presStyleLbl="parChTrans1D2" presStyleIdx="3" presStyleCnt="9"/>
+      <dgm:prSet presAssocID="{5A811E75-3DD0-44DD-9BCC-F92EFF5ABDF7}" presName="Name37" presStyleLbl="parChTrans1D2" presStyleIdx="2" presStyleCnt="8"/>
       <dgm:spPr/>
     </dgm:pt>
     <dgm:pt modelId="{7AEAB02B-19AE-460F-9814-FF450131A8E4}" type="pres">
@@ -3115,7 +3006,7 @@
       <dgm:spPr/>
     </dgm:pt>
     <dgm:pt modelId="{DB382909-05C0-478F-8EDC-74E6252E2D80}" type="pres">
-      <dgm:prSet presAssocID="{16A0762F-2B65-431A-BB38-8A45163690DE}" presName="rootText" presStyleLbl="node2" presStyleIdx="3" presStyleCnt="9">
+      <dgm:prSet presAssocID="{16A0762F-2B65-431A-BB38-8A45163690DE}" presName="rootText" presStyleLbl="node2" presStyleIdx="2" presStyleCnt="8">
         <dgm:presLayoutVars>
           <dgm:chPref val="3"/>
         </dgm:presLayoutVars>
@@ -3131,7 +3022,7 @@
       </dgm:spPr>
     </dgm:pt>
     <dgm:pt modelId="{B5545EE2-52F5-4176-888E-BDADFB004E5A}" type="pres">
-      <dgm:prSet presAssocID="{16A0762F-2B65-431A-BB38-8A45163690DE}" presName="rootConnector" presStyleLbl="node2" presStyleIdx="3" presStyleCnt="9"/>
+      <dgm:prSet presAssocID="{16A0762F-2B65-431A-BB38-8A45163690DE}" presName="rootConnector" presStyleLbl="node2" presStyleIdx="2" presStyleCnt="8"/>
       <dgm:spPr/>
     </dgm:pt>
     <dgm:pt modelId="{F7022938-B6AC-46C2-86E5-B4CDC8C46586}" type="pres">
@@ -3143,7 +3034,7 @@
       <dgm:spPr/>
     </dgm:pt>
     <dgm:pt modelId="{5F47D231-787A-4620-90EA-300798B8EA95}" type="pres">
-      <dgm:prSet presAssocID="{42221733-6F22-4E2A-91A8-9697A3A98043}" presName="Name37" presStyleLbl="parChTrans1D2" presStyleIdx="4" presStyleCnt="9"/>
+      <dgm:prSet presAssocID="{42221733-6F22-4E2A-91A8-9697A3A98043}" presName="Name37" presStyleLbl="parChTrans1D2" presStyleIdx="3" presStyleCnt="8"/>
       <dgm:spPr/>
     </dgm:pt>
     <dgm:pt modelId="{D8EADA65-4D4C-4B75-BDAC-86955112BDF1}" type="pres">
@@ -3159,7 +3050,7 @@
       <dgm:spPr/>
     </dgm:pt>
     <dgm:pt modelId="{5746B83C-5D69-42C5-8889-FAE289074D20}" type="pres">
-      <dgm:prSet presAssocID="{4E05081A-FC1E-428A-AF32-32329BFE5A32}" presName="rootText" presStyleLbl="node2" presStyleIdx="4" presStyleCnt="9" custLinFactNeighborX="-2695">
+      <dgm:prSet presAssocID="{4E05081A-FC1E-428A-AF32-32329BFE5A32}" presName="rootText" presStyleLbl="node2" presStyleIdx="3" presStyleCnt="8" custLinFactNeighborX="-2695">
         <dgm:presLayoutVars>
           <dgm:chPref val="3"/>
         </dgm:presLayoutVars>
@@ -3175,7 +3066,7 @@
       </dgm:spPr>
     </dgm:pt>
     <dgm:pt modelId="{7349AF61-A045-4F03-B0E6-01A273533202}" type="pres">
-      <dgm:prSet presAssocID="{4E05081A-FC1E-428A-AF32-32329BFE5A32}" presName="rootConnector" presStyleLbl="node2" presStyleIdx="4" presStyleCnt="9"/>
+      <dgm:prSet presAssocID="{4E05081A-FC1E-428A-AF32-32329BFE5A32}" presName="rootConnector" presStyleLbl="node2" presStyleIdx="3" presStyleCnt="8"/>
       <dgm:spPr/>
     </dgm:pt>
     <dgm:pt modelId="{F31F0BA7-586F-4117-8CAF-A8E4A3E92E34}" type="pres">
@@ -3187,7 +3078,7 @@
       <dgm:spPr/>
     </dgm:pt>
     <dgm:pt modelId="{7A4B89B8-8725-4F4E-8A8B-755EE4D4857D}" type="pres">
-      <dgm:prSet presAssocID="{978B8173-BB9C-45F0-A760-7367B01831FB}" presName="Name37" presStyleLbl="parChTrans1D2" presStyleIdx="5" presStyleCnt="9"/>
+      <dgm:prSet presAssocID="{978B8173-BB9C-45F0-A760-7367B01831FB}" presName="Name37" presStyleLbl="parChTrans1D2" presStyleIdx="4" presStyleCnt="8"/>
       <dgm:spPr/>
     </dgm:pt>
     <dgm:pt modelId="{9D76218B-72BE-4A9B-86DC-BF65C57E60A3}" type="pres">
@@ -3203,7 +3094,7 @@
       <dgm:spPr/>
     </dgm:pt>
     <dgm:pt modelId="{E911C1DE-D631-47A5-AD0B-1CBECFF8B70C}" type="pres">
-      <dgm:prSet presAssocID="{8E31F887-63BC-4F13-B78F-89F1F78D84AB}" presName="rootText" presStyleLbl="node2" presStyleIdx="5" presStyleCnt="9">
+      <dgm:prSet presAssocID="{8E31F887-63BC-4F13-B78F-89F1F78D84AB}" presName="rootText" presStyleLbl="node2" presStyleIdx="4" presStyleCnt="8">
         <dgm:presLayoutVars>
           <dgm:chPref val="3"/>
         </dgm:presLayoutVars>
@@ -3219,7 +3110,7 @@
       </dgm:spPr>
     </dgm:pt>
     <dgm:pt modelId="{11D33C27-387D-4153-9AD3-21C625F4CAD9}" type="pres">
-      <dgm:prSet presAssocID="{8E31F887-63BC-4F13-B78F-89F1F78D84AB}" presName="rootConnector" presStyleLbl="node2" presStyleIdx="5" presStyleCnt="9"/>
+      <dgm:prSet presAssocID="{8E31F887-63BC-4F13-B78F-89F1F78D84AB}" presName="rootConnector" presStyleLbl="node2" presStyleIdx="4" presStyleCnt="8"/>
       <dgm:spPr/>
     </dgm:pt>
     <dgm:pt modelId="{27EB8EDE-7CB9-4437-89FD-4D2357F1D352}" type="pres">
@@ -3231,7 +3122,7 @@
       <dgm:spPr/>
     </dgm:pt>
     <dgm:pt modelId="{2283A390-88DD-4FB6-B85C-86AAAF55BA89}" type="pres">
-      <dgm:prSet presAssocID="{1814F7F7-10F8-46DC-B374-5A65873E2813}" presName="Name37" presStyleLbl="parChTrans1D2" presStyleIdx="6" presStyleCnt="9"/>
+      <dgm:prSet presAssocID="{1814F7F7-10F8-46DC-B374-5A65873E2813}" presName="Name37" presStyleLbl="parChTrans1D2" presStyleIdx="5" presStyleCnt="8"/>
       <dgm:spPr/>
     </dgm:pt>
     <dgm:pt modelId="{B0392D86-5E2C-45CC-8F38-D475D6CFE907}" type="pres">
@@ -3247,7 +3138,7 @@
       <dgm:spPr/>
     </dgm:pt>
     <dgm:pt modelId="{6387E1E4-2E36-41AC-8665-DA093ADD23CD}" type="pres">
-      <dgm:prSet presAssocID="{3DF92B69-EA72-42DB-919A-39EE9C7F5601}" presName="rootText" presStyleLbl="node2" presStyleIdx="6" presStyleCnt="9" custScaleX="109208" custScaleY="97358" custLinFactNeighborX="0">
+      <dgm:prSet presAssocID="{3DF92B69-EA72-42DB-919A-39EE9C7F5601}" presName="rootText" presStyleLbl="node2" presStyleIdx="5" presStyleCnt="8" custScaleX="109208" custScaleY="97358" custLinFactNeighborX="0">
         <dgm:presLayoutVars>
           <dgm:chPref val="3"/>
         </dgm:presLayoutVars>
@@ -3263,7 +3154,7 @@
       </dgm:spPr>
     </dgm:pt>
     <dgm:pt modelId="{70FB7394-E37A-4533-8FA5-378EAFD40FEF}" type="pres">
-      <dgm:prSet presAssocID="{3DF92B69-EA72-42DB-919A-39EE9C7F5601}" presName="rootConnector" presStyleLbl="node2" presStyleIdx="6" presStyleCnt="9"/>
+      <dgm:prSet presAssocID="{3DF92B69-EA72-42DB-919A-39EE9C7F5601}" presName="rootConnector" presStyleLbl="node2" presStyleIdx="5" presStyleCnt="8"/>
       <dgm:spPr/>
     </dgm:pt>
     <dgm:pt modelId="{D6B88F4D-742C-492E-AD08-47E2A4E3A728}" type="pres">
@@ -3271,7 +3162,7 @@
       <dgm:spPr/>
     </dgm:pt>
     <dgm:pt modelId="{17EE28FF-8422-4AFE-8920-64A757C82BAB}" type="pres">
-      <dgm:prSet presAssocID="{16ACF20D-0821-40FA-8E03-80DAD7C80136}" presName="Name37" presStyleLbl="parChTrans1D3" presStyleIdx="8" presStyleCnt="11"/>
+      <dgm:prSet presAssocID="{16ACF20D-0821-40FA-8E03-80DAD7C80136}" presName="Name37" presStyleLbl="parChTrans1D3" presStyleIdx="8" presStyleCnt="10"/>
       <dgm:spPr/>
     </dgm:pt>
     <dgm:pt modelId="{6FE489D0-48E0-4C1B-B9D7-7FF345F71474}" type="pres">
@@ -3287,7 +3178,7 @@
       <dgm:spPr/>
     </dgm:pt>
     <dgm:pt modelId="{A6D1BAD3-E13E-4527-81EC-D4617BB13AF8}" type="pres">
-      <dgm:prSet presAssocID="{752606F1-13CB-4F46-9004-36998FC79239}" presName="rootText" presStyleLbl="node3" presStyleIdx="8" presStyleCnt="11" custLinFactNeighborY="1287">
+      <dgm:prSet presAssocID="{752606F1-13CB-4F46-9004-36998FC79239}" presName="rootText" presStyleLbl="node3" presStyleIdx="8" presStyleCnt="10" custLinFactNeighborY="1287">
         <dgm:presLayoutVars>
           <dgm:chPref val="3"/>
         </dgm:presLayoutVars>
@@ -3295,7 +3186,7 @@
       <dgm:spPr/>
     </dgm:pt>
     <dgm:pt modelId="{61CA32C5-8119-4B43-BC4C-5464E8B67614}" type="pres">
-      <dgm:prSet presAssocID="{752606F1-13CB-4F46-9004-36998FC79239}" presName="rootConnector" presStyleLbl="node3" presStyleIdx="8" presStyleCnt="11"/>
+      <dgm:prSet presAssocID="{752606F1-13CB-4F46-9004-36998FC79239}" presName="rootConnector" presStyleLbl="node3" presStyleIdx="8" presStyleCnt="10"/>
       <dgm:spPr/>
     </dgm:pt>
     <dgm:pt modelId="{2008A448-B157-469C-AF90-9E4DFB37422A}" type="pres">
@@ -3307,7 +3198,7 @@
       <dgm:spPr/>
     </dgm:pt>
     <dgm:pt modelId="{BFFDE244-4A16-46EC-B371-1FCE835E28A3}" type="pres">
-      <dgm:prSet presAssocID="{E2DD5B65-B7A9-4FEA-81D2-E5F69BDA9909}" presName="Name37" presStyleLbl="parChTrans1D3" presStyleIdx="9" presStyleCnt="11"/>
+      <dgm:prSet presAssocID="{E2DD5B65-B7A9-4FEA-81D2-E5F69BDA9909}" presName="Name37" presStyleLbl="parChTrans1D3" presStyleIdx="9" presStyleCnt="10"/>
       <dgm:spPr/>
     </dgm:pt>
     <dgm:pt modelId="{DC388750-29B5-4DC4-8AE1-DD92C6F7E970}" type="pres">
@@ -3323,7 +3214,7 @@
       <dgm:spPr/>
     </dgm:pt>
     <dgm:pt modelId="{7DC92F64-5D8A-45B1-95FA-6B3E570AA4CB}" type="pres">
-      <dgm:prSet presAssocID="{AD6355A4-9D44-46F5-8B3F-030A3A01D43D}" presName="rootText" presStyleLbl="node3" presStyleIdx="9" presStyleCnt="11" custLinFactNeighborY="1287">
+      <dgm:prSet presAssocID="{AD6355A4-9D44-46F5-8B3F-030A3A01D43D}" presName="rootText" presStyleLbl="node3" presStyleIdx="9" presStyleCnt="10" custLinFactNeighborY="1287">
         <dgm:presLayoutVars>
           <dgm:chPref val="3"/>
         </dgm:presLayoutVars>
@@ -3331,7 +3222,7 @@
       <dgm:spPr/>
     </dgm:pt>
     <dgm:pt modelId="{50F1C57E-3227-49C0-972A-DD26870D189C}" type="pres">
-      <dgm:prSet presAssocID="{AD6355A4-9D44-46F5-8B3F-030A3A01D43D}" presName="rootConnector" presStyleLbl="node3" presStyleIdx="9" presStyleCnt="11"/>
+      <dgm:prSet presAssocID="{AD6355A4-9D44-46F5-8B3F-030A3A01D43D}" presName="rootConnector" presStyleLbl="node3" presStyleIdx="9" presStyleCnt="10"/>
       <dgm:spPr/>
     </dgm:pt>
     <dgm:pt modelId="{102A8C6F-7EAE-44EA-AEB1-C7F852612F35}" type="pres">
@@ -3342,48 +3233,12 @@
       <dgm:prSet presAssocID="{AD6355A4-9D44-46F5-8B3F-030A3A01D43D}" presName="hierChild5" presStyleCnt="0"/>
       <dgm:spPr/>
     </dgm:pt>
-    <dgm:pt modelId="{0BD1F90B-CDF2-4C59-9720-A983E71C4563}" type="pres">
-      <dgm:prSet presAssocID="{5B0E6DDA-0F05-4A5F-9B61-0D9BBCEE9FDA}" presName="Name37" presStyleLbl="parChTrans1D3" presStyleIdx="10" presStyleCnt="11"/>
-      <dgm:spPr/>
-    </dgm:pt>
-    <dgm:pt modelId="{FFCB62BC-396B-4019-9B18-0DD07BD94690}" type="pres">
-      <dgm:prSet presAssocID="{56EA6BB8-FB46-41EE-BE2A-5BDA4733612D}" presName="hierRoot2" presStyleCnt="0">
-        <dgm:presLayoutVars>
-          <dgm:hierBranch val="init"/>
-        </dgm:presLayoutVars>
-      </dgm:prSet>
-      <dgm:spPr/>
-    </dgm:pt>
-    <dgm:pt modelId="{93320B2F-7EFA-4F16-A457-433F59E00A8D}" type="pres">
-      <dgm:prSet presAssocID="{56EA6BB8-FB46-41EE-BE2A-5BDA4733612D}" presName="rootComposite" presStyleCnt="0"/>
-      <dgm:spPr/>
-    </dgm:pt>
-    <dgm:pt modelId="{9E7841B2-EBAD-4701-890D-0C1033E70FDA}" type="pres">
-      <dgm:prSet presAssocID="{56EA6BB8-FB46-41EE-BE2A-5BDA4733612D}" presName="rootText" presStyleLbl="node3" presStyleIdx="10" presStyleCnt="11">
-        <dgm:presLayoutVars>
-          <dgm:chPref val="3"/>
-        </dgm:presLayoutVars>
-      </dgm:prSet>
-      <dgm:spPr/>
-    </dgm:pt>
-    <dgm:pt modelId="{1F94D6CF-35E1-4E7C-8006-6B6579BF3FB3}" type="pres">
-      <dgm:prSet presAssocID="{56EA6BB8-FB46-41EE-BE2A-5BDA4733612D}" presName="rootConnector" presStyleLbl="node3" presStyleIdx="10" presStyleCnt="11"/>
-      <dgm:spPr/>
-    </dgm:pt>
-    <dgm:pt modelId="{03FD4BC4-DEF4-49A5-A8C3-E16A29AA01F8}" type="pres">
-      <dgm:prSet presAssocID="{56EA6BB8-FB46-41EE-BE2A-5BDA4733612D}" presName="hierChild4" presStyleCnt="0"/>
-      <dgm:spPr/>
-    </dgm:pt>
-    <dgm:pt modelId="{E0DC56F0-7B27-4877-80A1-B94ADE8A8727}" type="pres">
-      <dgm:prSet presAssocID="{56EA6BB8-FB46-41EE-BE2A-5BDA4733612D}" presName="hierChild5" presStyleCnt="0"/>
-      <dgm:spPr/>
-    </dgm:pt>
     <dgm:pt modelId="{008A3A30-ACD0-467B-86A3-1AFE02E94782}" type="pres">
       <dgm:prSet presAssocID="{3DF92B69-EA72-42DB-919A-39EE9C7F5601}" presName="hierChild5" presStyleCnt="0"/>
       <dgm:spPr/>
     </dgm:pt>
     <dgm:pt modelId="{FA44FF64-0A9C-4CC7-9A79-1F7CEF1CECCC}" type="pres">
-      <dgm:prSet presAssocID="{83D57C77-11EB-45AB-90EC-FAA3213DE0E0}" presName="Name37" presStyleLbl="parChTrans1D2" presStyleIdx="7" presStyleCnt="9"/>
+      <dgm:prSet presAssocID="{83D57C77-11EB-45AB-90EC-FAA3213DE0E0}" presName="Name37" presStyleLbl="parChTrans1D2" presStyleIdx="6" presStyleCnt="8"/>
       <dgm:spPr/>
     </dgm:pt>
     <dgm:pt modelId="{604EC9BF-20D0-40E1-A358-4E642361B4E6}" type="pres">
@@ -3399,7 +3254,7 @@
       <dgm:spPr/>
     </dgm:pt>
     <dgm:pt modelId="{48346BFF-0CEE-4005-8D91-4DCD324957F4}" type="pres">
-      <dgm:prSet presAssocID="{F499F1A4-A6D2-4E95-830C-E886F5D65D25}" presName="rootText" presStyleLbl="node2" presStyleIdx="7" presStyleCnt="9">
+      <dgm:prSet presAssocID="{F499F1A4-A6D2-4E95-830C-E886F5D65D25}" presName="rootText" presStyleLbl="node2" presStyleIdx="6" presStyleCnt="8">
         <dgm:presLayoutVars>
           <dgm:chPref val="3"/>
         </dgm:presLayoutVars>
@@ -3415,7 +3270,7 @@
       </dgm:spPr>
     </dgm:pt>
     <dgm:pt modelId="{1B1C5A4E-7BD7-4E8B-BB88-B3CBF4E1B489}" type="pres">
-      <dgm:prSet presAssocID="{F499F1A4-A6D2-4E95-830C-E886F5D65D25}" presName="rootConnector" presStyleLbl="node2" presStyleIdx="7" presStyleCnt="9"/>
+      <dgm:prSet presAssocID="{F499F1A4-A6D2-4E95-830C-E886F5D65D25}" presName="rootConnector" presStyleLbl="node2" presStyleIdx="6" presStyleCnt="8"/>
       <dgm:spPr/>
     </dgm:pt>
     <dgm:pt modelId="{CE76534F-34B9-4AE5-B465-DAB80E8F3693}" type="pres">
@@ -3427,7 +3282,7 @@
       <dgm:spPr/>
     </dgm:pt>
     <dgm:pt modelId="{B150B2DE-85D9-429C-B196-61C30597AF65}" type="pres">
-      <dgm:prSet presAssocID="{5696D004-D6B5-438D-8AD5-B1385A0E2AE3}" presName="Name37" presStyleLbl="parChTrans1D2" presStyleIdx="8" presStyleCnt="9"/>
+      <dgm:prSet presAssocID="{5696D004-D6B5-438D-8AD5-B1385A0E2AE3}" presName="Name37" presStyleLbl="parChTrans1D2" presStyleIdx="7" presStyleCnt="8"/>
       <dgm:spPr/>
     </dgm:pt>
     <dgm:pt modelId="{7BF6E57F-A3B6-49B6-A35A-97CE281DFCCD}" type="pres">
@@ -3443,7 +3298,7 @@
       <dgm:spPr/>
     </dgm:pt>
     <dgm:pt modelId="{56A3BAB8-C607-4CB1-BF6B-DB77080C7495}" type="pres">
-      <dgm:prSet presAssocID="{A501B367-66BE-45B7-AC85-9EA28F53BE00}" presName="rootText" presStyleLbl="node2" presStyleIdx="8" presStyleCnt="9">
+      <dgm:prSet presAssocID="{A501B367-66BE-45B7-AC85-9EA28F53BE00}" presName="rootText" presStyleLbl="node2" presStyleIdx="7" presStyleCnt="8">
         <dgm:presLayoutVars>
           <dgm:chPref val="3"/>
         </dgm:presLayoutVars>
@@ -3459,7 +3314,7 @@
       </dgm:spPr>
     </dgm:pt>
     <dgm:pt modelId="{A92DC098-F82F-4FD2-9196-7441FCB19036}" type="pres">
-      <dgm:prSet presAssocID="{A501B367-66BE-45B7-AC85-9EA28F53BE00}" presName="rootConnector" presStyleLbl="node2" presStyleIdx="8" presStyleCnt="9"/>
+      <dgm:prSet presAssocID="{A501B367-66BE-45B7-AC85-9EA28F53BE00}" presName="rootConnector" presStyleLbl="node2" presStyleIdx="7" presStyleCnt="8"/>
       <dgm:spPr/>
     </dgm:pt>
     <dgm:pt modelId="{6EA73A96-2FD5-4E92-9434-060BABA0075E}" type="pres">
@@ -3480,7 +3335,6 @@
     <dgm:cxn modelId="{CD503702-736E-4CF9-907F-BBACECBC4E7B}" type="presOf" srcId="{C2C95360-4E0F-4BAE-92E7-C888B269E4D1}" destId="{6AFDF369-C7C5-49F9-814F-BA87F2D8D4FA}" srcOrd="1" destOrd="0" presId="urn:microsoft.com/office/officeart/2005/8/layout/orgChart1"/>
     <dgm:cxn modelId="{F784C807-9A9F-4F8A-8990-8ED4E423B679}" type="presOf" srcId="{B33F8F8B-9529-4776-AA67-AB17FA92F5F2}" destId="{B3039094-0E85-440F-8060-B13F2AFB1B44}" srcOrd="0" destOrd="0" presId="urn:microsoft.com/office/officeart/2005/8/layout/orgChart1"/>
     <dgm:cxn modelId="{41079E0A-2BEB-4FA5-BC55-638740C2C4C0}" type="presOf" srcId="{9C138485-B523-4E4F-ACF2-E35232DC907E}" destId="{2244FC6E-6986-4E70-ADA5-D20EF7188AE4}" srcOrd="0" destOrd="0" presId="urn:microsoft.com/office/officeart/2005/8/layout/orgChart1"/>
-    <dgm:cxn modelId="{B3F7470B-5F64-4825-A5DD-0B143E7AE0BB}" type="presOf" srcId="{56EA6BB8-FB46-41EE-BE2A-5BDA4733612D}" destId="{9E7841B2-EBAD-4701-890D-0C1033E70FDA}" srcOrd="0" destOrd="0" presId="urn:microsoft.com/office/officeart/2005/8/layout/orgChart1"/>
     <dgm:cxn modelId="{1DA3260C-01AC-4FE6-8B67-4C60BD5C2299}" type="presOf" srcId="{AD6355A4-9D44-46F5-8B3F-030A3A01D43D}" destId="{50F1C57E-3227-49C0-972A-DD26870D189C}" srcOrd="1" destOrd="0" presId="urn:microsoft.com/office/officeart/2005/8/layout/orgChart1"/>
     <dgm:cxn modelId="{5B1A600F-4552-42C9-8C3E-923C6221CBCB}" type="presOf" srcId="{DDFD1914-59A4-4644-A4F0-79CB5B0619EF}" destId="{17DBEF4E-9197-4AFC-8B80-47C4CA356FD3}" srcOrd="0" destOrd="0" presId="urn:microsoft.com/office/officeart/2005/8/layout/orgChart1"/>
     <dgm:cxn modelId="{9CEBDA14-C66C-4420-B9F3-C9B45AC0E8AF}" type="presOf" srcId="{1B253C7D-EB20-477C-AEE4-C78EC91813A0}" destId="{24C8DD71-B5AF-41E8-BF80-2803D28A1A5F}" srcOrd="1" destOrd="0" presId="urn:microsoft.com/office/officeart/2005/8/layout/orgChart1"/>
@@ -3504,15 +3358,13 @@
     <dgm:cxn modelId="{8777EC61-6F94-490C-8FDA-A94CB8634DC5}" type="presOf" srcId="{F499F1A4-A6D2-4E95-830C-E886F5D65D25}" destId="{1B1C5A4E-7BD7-4E8B-BB88-B3CBF4E1B489}" srcOrd="1" destOrd="0" presId="urn:microsoft.com/office/officeart/2005/8/layout/orgChart1"/>
     <dgm:cxn modelId="{85A43A62-D80C-4752-852D-46E1BBBA2F6D}" type="presOf" srcId="{8E31F887-63BC-4F13-B78F-89F1F78D84AB}" destId="{11D33C27-387D-4153-9AD3-21C625F4CAD9}" srcOrd="1" destOrd="0" presId="urn:microsoft.com/office/officeart/2005/8/layout/orgChart1"/>
     <dgm:cxn modelId="{90D21A63-9283-436D-A36F-5A1DBE2C1E06}" type="presOf" srcId="{B54B09A1-4CFE-4869-9C1A-390E4640E116}" destId="{1C395FA0-903A-4395-9EBE-C5F8426C9FA2}" srcOrd="0" destOrd="0" presId="urn:microsoft.com/office/officeart/2005/8/layout/orgChart1"/>
-    <dgm:cxn modelId="{0A9CEB63-7558-4ED9-A215-E9D86CCB21BB}" type="presOf" srcId="{77AF0B6E-BD97-4C8F-AF92-5BA948A731BD}" destId="{9C05F8D8-C192-487B-A4F5-E74AB9FAD369}" srcOrd="1" destOrd="0" presId="urn:microsoft.com/office/officeart/2005/8/layout/orgChart1"/>
     <dgm:cxn modelId="{A6D6A745-2C15-4AD7-91D2-CCD040B25C50}" type="presOf" srcId="{355621C0-62E3-4188-9461-E7708E24A937}" destId="{CD8C52B1-0275-4306-8873-659681018C36}" srcOrd="0" destOrd="0" presId="urn:microsoft.com/office/officeart/2005/8/layout/orgChart1"/>
     <dgm:cxn modelId="{08B52147-6D83-4EAF-991F-A523410F0603}" type="presOf" srcId="{5696D004-D6B5-438D-8AD5-B1385A0E2AE3}" destId="{B150B2DE-85D9-429C-B196-61C30597AF65}" srcOrd="0" destOrd="0" presId="urn:microsoft.com/office/officeart/2005/8/layout/orgChart1"/>
     <dgm:cxn modelId="{3D1CB148-7943-4510-9F5B-2DBA29C764C8}" type="presOf" srcId="{AD6355A4-9D44-46F5-8B3F-030A3A01D43D}" destId="{7DC92F64-5D8A-45B1-95FA-6B3E570AA4CB}" srcOrd="0" destOrd="0" presId="urn:microsoft.com/office/officeart/2005/8/layout/orgChart1"/>
     <dgm:cxn modelId="{317DEA69-D61D-42FD-8B5A-3BE7851E1E8E}" type="presOf" srcId="{A501B367-66BE-45B7-AC85-9EA28F53BE00}" destId="{A92DC098-F82F-4FD2-9196-7441FCB19036}" srcOrd="1" destOrd="0" presId="urn:microsoft.com/office/officeart/2005/8/layout/orgChart1"/>
-    <dgm:cxn modelId="{7105336A-C58B-4122-AC7A-5B4B09D1C0AF}" type="presOf" srcId="{790D96E9-46AF-4A3B-A2D3-A6B0E4575C26}" destId="{ADFD04E9-E27B-43C8-B910-7FB1EC572950}" srcOrd="0" destOrd="0" presId="urn:microsoft.com/office/officeart/2005/8/layout/orgChart1"/>
     <dgm:cxn modelId="{E650D14C-12DF-4DBA-BF1F-017709FACA66}" type="presOf" srcId="{B5720F83-2059-4BD9-91E1-34F32E5CB304}" destId="{B1C0BB44-8990-4179-B9B3-CE0750374B87}" srcOrd="0" destOrd="0" presId="urn:microsoft.com/office/officeart/2005/8/layout/orgChart1"/>
     <dgm:cxn modelId="{EBC3184F-455B-47FC-8B7C-53E3391D3AAF}" type="presOf" srcId="{3A71B239-AE46-48BA-852B-CD13632D0C2C}" destId="{504D1EB5-4E3B-41E0-B0ED-3F607A709605}" srcOrd="0" destOrd="0" presId="urn:microsoft.com/office/officeart/2005/8/layout/orgChart1"/>
-    <dgm:cxn modelId="{70AF8752-11B2-4EAB-91F3-0E8139D33E77}" srcId="{B5720F83-2059-4BD9-91E1-34F32E5CB304}" destId="{A501B367-66BE-45B7-AC85-9EA28F53BE00}" srcOrd="8" destOrd="0" parTransId="{5696D004-D6B5-438D-8AD5-B1385A0E2AE3}" sibTransId="{8922D1AC-7860-47B5-A008-2E4C74F220A2}"/>
+    <dgm:cxn modelId="{70AF8752-11B2-4EAB-91F3-0E8139D33E77}" srcId="{B5720F83-2059-4BD9-91E1-34F32E5CB304}" destId="{A501B367-66BE-45B7-AC85-9EA28F53BE00}" srcOrd="7" destOrd="0" parTransId="{5696D004-D6B5-438D-8AD5-B1385A0E2AE3}" sibTransId="{8922D1AC-7860-47B5-A008-2E4C74F220A2}"/>
     <dgm:cxn modelId="{A8A0EB72-FC53-4681-B5C2-86965C755FD5}" srcId="{C2C95360-4E0F-4BAE-92E7-C888B269E4D1}" destId="{56E4E874-A403-4372-8362-3C5B550269EB}" srcOrd="2" destOrd="0" parTransId="{3A71B239-AE46-48BA-852B-CD13632D0C2C}" sibTransId="{30B1104C-B628-464A-8197-C416810B8F28}"/>
     <dgm:cxn modelId="{15713C53-861D-40F9-BA33-9A58997E6A41}" type="presOf" srcId="{978B8173-BB9C-45F0-A760-7367B01831FB}" destId="{7A4B89B8-8725-4F4E-8A8B-755EE4D4857D}" srcOrd="0" destOrd="0" presId="urn:microsoft.com/office/officeart/2005/8/layout/orgChart1"/>
     <dgm:cxn modelId="{51C30278-C4CF-46F1-B54D-C1ABA64C3AC1}" type="presOf" srcId="{DDFD1914-59A4-4644-A4F0-79CB5B0619EF}" destId="{DAD40E46-1AE9-45B6-A895-1C40B19C30D4}" srcOrd="1" destOrd="0" presId="urn:microsoft.com/office/officeart/2005/8/layout/orgChart1"/>
@@ -3522,44 +3374,39 @@
     <dgm:cxn modelId="{0434128F-EE6D-4CD6-93F4-E2A7419F3638}" type="presOf" srcId="{5A811E75-3DD0-44DD-9BCC-F92EFF5ABDF7}" destId="{F77C2B19-2A94-47E3-8D6C-EBC149703009}" srcOrd="0" destOrd="0" presId="urn:microsoft.com/office/officeart/2005/8/layout/orgChart1"/>
     <dgm:cxn modelId="{BE2A6998-10E4-4C01-A5B2-0C35D24A1FDB}" type="presOf" srcId="{8873C710-6C9D-49CA-A82F-CA6366DBC195}" destId="{ADCD2133-654C-430B-93BA-F3A8CCB4ACEF}" srcOrd="0" destOrd="0" presId="urn:microsoft.com/office/officeart/2005/8/layout/orgChart1"/>
     <dgm:cxn modelId="{1FBF3C9B-80E0-4DAB-BD18-CDCBB9C8AE22}" type="presOf" srcId="{4E05081A-FC1E-428A-AF32-32329BFE5A32}" destId="{5746B83C-5D69-42C5-8889-FAE289074D20}" srcOrd="0" destOrd="0" presId="urn:microsoft.com/office/officeart/2005/8/layout/orgChart1"/>
-    <dgm:cxn modelId="{585C6B9B-9212-4333-9D5F-BB4329797DC2}" srcId="{B5720F83-2059-4BD9-91E1-34F32E5CB304}" destId="{16A0762F-2B65-431A-BB38-8A45163690DE}" srcOrd="3" destOrd="0" parTransId="{5A811E75-3DD0-44DD-9BCC-F92EFF5ABDF7}" sibTransId="{415C27B0-F118-41F6-993D-4BFE9BCED54B}"/>
+    <dgm:cxn modelId="{585C6B9B-9212-4333-9D5F-BB4329797DC2}" srcId="{B5720F83-2059-4BD9-91E1-34F32E5CB304}" destId="{16A0762F-2B65-431A-BB38-8A45163690DE}" srcOrd="2" destOrd="0" parTransId="{5A811E75-3DD0-44DD-9BCC-F92EFF5ABDF7}" sibTransId="{415C27B0-F118-41F6-993D-4BFE9BCED54B}"/>
     <dgm:cxn modelId="{0149D99C-1032-4996-903C-78DED485A3DF}" type="presOf" srcId="{56E4E874-A403-4372-8362-3C5B550269EB}" destId="{6092F6C3-6B05-47CF-BE92-FD65EBAAB336}" srcOrd="1" destOrd="0" presId="urn:microsoft.com/office/officeart/2005/8/layout/orgChart1"/>
     <dgm:cxn modelId="{C6D1B99F-8C3A-4379-979B-BA7FE528A583}" type="presOf" srcId="{3DF92B69-EA72-42DB-919A-39EE9C7F5601}" destId="{70FB7394-E37A-4533-8FA5-378EAFD40FEF}" srcOrd="1" destOrd="0" presId="urn:microsoft.com/office/officeart/2005/8/layout/orgChart1"/>
     <dgm:cxn modelId="{573A94A1-E42C-4A4D-B618-55851AFFE0FB}" type="presOf" srcId="{16A0762F-2B65-431A-BB38-8A45163690DE}" destId="{DB382909-05C0-478F-8EDC-74E6252E2D80}" srcOrd="0" destOrd="0" presId="urn:microsoft.com/office/officeart/2005/8/layout/orgChart1"/>
     <dgm:cxn modelId="{5002FBA4-BE4D-4BCA-BABC-59B6251ED2FE}" type="presOf" srcId="{89B0B941-BFCC-42B7-ABDE-0463123F8754}" destId="{70FE5A25-E2A2-4C72-AC06-D09221AB8C88}" srcOrd="0" destOrd="0" presId="urn:microsoft.com/office/officeart/2005/8/layout/orgChart1"/>
-    <dgm:cxn modelId="{437049A7-86B4-42C1-9FAE-A74E94497A71}" type="presOf" srcId="{5B0E6DDA-0F05-4A5F-9B61-0D9BBCEE9FDA}" destId="{0BD1F90B-CDF2-4C59-9720-A983E71C4563}" srcOrd="0" destOrd="0" presId="urn:microsoft.com/office/officeart/2005/8/layout/orgChart1"/>
     <dgm:cxn modelId="{00D69DB0-3BF6-4CB3-8CF3-0E7E4F2E0062}" type="presOf" srcId="{752606F1-13CB-4F46-9004-36998FC79239}" destId="{A6D1BAD3-E13E-4527-81EC-D4617BB13AF8}" srcOrd="0" destOrd="0" presId="urn:microsoft.com/office/officeart/2005/8/layout/orgChart1"/>
     <dgm:cxn modelId="{1D40C7B3-C58E-4074-A07F-BF3DA9320961}" type="presOf" srcId="{E2DD5B65-B7A9-4FEA-81D2-E5F69BDA9909}" destId="{BFFDE244-4A16-46EC-B371-1FCE835E28A3}" srcOrd="0" destOrd="0" presId="urn:microsoft.com/office/officeart/2005/8/layout/orgChart1"/>
     <dgm:cxn modelId="{0B926BB5-6FC1-4059-B83A-D60D13050F99}" type="presOf" srcId="{8F940151-574B-495C-8582-AEC8DBEB8FC3}" destId="{6DB89535-9ED7-4C60-B813-D422E81AC957}" srcOrd="0" destOrd="0" presId="urn:microsoft.com/office/officeart/2005/8/layout/orgChart1"/>
     <dgm:cxn modelId="{5E10F7B5-9D5C-48F0-8866-6A2A46E12F1A}" type="presOf" srcId="{0F4E0B57-0F30-404F-A40B-B0F498924B71}" destId="{CE389DA5-3827-44AC-98CB-FDD6906625BA}" srcOrd="0" destOrd="0" presId="urn:microsoft.com/office/officeart/2005/8/layout/orgChart1"/>
     <dgm:cxn modelId="{A1F528B6-E831-4113-8F81-74369985DBA3}" srcId="{3DF92B69-EA72-42DB-919A-39EE9C7F5601}" destId="{752606F1-13CB-4F46-9004-36998FC79239}" srcOrd="0" destOrd="0" parTransId="{16ACF20D-0821-40FA-8E03-80DAD7C80136}" sibTransId="{CE976FCA-1BAA-410E-AF63-B24F9869916D}"/>
     <dgm:cxn modelId="{218025B7-C1D9-4E65-A042-0F26E8BB02E5}" type="presOf" srcId="{3DF92B69-EA72-42DB-919A-39EE9C7F5601}" destId="{6387E1E4-2E36-41AC-8665-DA093ADD23CD}" srcOrd="0" destOrd="0" presId="urn:microsoft.com/office/officeart/2005/8/layout/orgChart1"/>
-    <dgm:cxn modelId="{36C846B7-3377-4CFA-A295-C1F735F48B62}" type="presOf" srcId="{56EA6BB8-FB46-41EE-BE2A-5BDA4733612D}" destId="{1F94D6CF-35E1-4E7C-8006-6B6579BF3FB3}" srcOrd="1" destOrd="0" presId="urn:microsoft.com/office/officeart/2005/8/layout/orgChart1"/>
     <dgm:cxn modelId="{C26D30BE-3E6F-46F3-BC3D-F19C5DEBA3E1}" type="presOf" srcId="{AE11A560-868D-432A-B204-67149B05C9CD}" destId="{E0999DEB-DFC8-4943-A105-F4F46072C549}" srcOrd="0" destOrd="0" presId="urn:microsoft.com/office/officeart/2005/8/layout/orgChart1"/>
     <dgm:cxn modelId="{D9CD08BF-3955-450E-8492-170C61705E8C}" type="presOf" srcId="{16A0762F-2B65-431A-BB38-8A45163690DE}" destId="{B5545EE2-52F5-4176-888E-BDADFB004E5A}" srcOrd="1" destOrd="0" presId="urn:microsoft.com/office/officeart/2005/8/layout/orgChart1"/>
     <dgm:cxn modelId="{90FC1EC1-141D-4431-8AC8-688AC831A602}" type="presOf" srcId="{5A73290C-8330-4E7A-8389-501F591DF3CA}" destId="{BED080A5-0EB9-475E-BB32-254D8B47DAA3}" srcOrd="0" destOrd="0" presId="urn:microsoft.com/office/officeart/2005/8/layout/orgChart1"/>
     <dgm:cxn modelId="{2E97ABC1-4F3B-40F1-B1A5-4A188FBD539E}" type="presOf" srcId="{42221733-6F22-4E2A-91A8-9697A3A98043}" destId="{5F47D231-787A-4620-90EA-300798B8EA95}" srcOrd="0" destOrd="0" presId="urn:microsoft.com/office/officeart/2005/8/layout/orgChart1"/>
-    <dgm:cxn modelId="{28A0CAC1-221E-428B-B502-B5D14648EFC1}" srcId="{B5720F83-2059-4BD9-91E1-34F32E5CB304}" destId="{F499F1A4-A6D2-4E95-830C-E886F5D65D25}" srcOrd="7" destOrd="0" parTransId="{83D57C77-11EB-45AB-90EC-FAA3213DE0E0}" sibTransId="{12B67E4D-36C7-4834-8BB2-35CA76B2FDB4}"/>
+    <dgm:cxn modelId="{28A0CAC1-221E-428B-B502-B5D14648EFC1}" srcId="{B5720F83-2059-4BD9-91E1-34F32E5CB304}" destId="{F499F1A4-A6D2-4E95-830C-E886F5D65D25}" srcOrd="6" destOrd="0" parTransId="{83D57C77-11EB-45AB-90EC-FAA3213DE0E0}" sibTransId="{12B67E4D-36C7-4834-8BB2-35CA76B2FDB4}"/>
     <dgm:cxn modelId="{A40D6CC3-FB72-48D7-A914-434117A3BB12}" srcId="{C2C95360-4E0F-4BAE-92E7-C888B269E4D1}" destId="{B33F8F8B-9529-4776-AA67-AB17FA92F5F2}" srcOrd="1" destOrd="0" parTransId="{5A73290C-8330-4E7A-8389-501F591DF3CA}" sibTransId="{D9F2B9E4-A203-4C0D-858B-84F5DA6C8929}"/>
-    <dgm:cxn modelId="{4954AFC7-19A5-4295-BD38-DC205BF066BD}" srcId="{3DF92B69-EA72-42DB-919A-39EE9C7F5601}" destId="{56EA6BB8-FB46-41EE-BE2A-5BDA4733612D}" srcOrd="2" destOrd="0" parTransId="{5B0E6DDA-0F05-4A5F-9B61-0D9BBCEE9FDA}" sibTransId="{D9EA5FAE-CE1E-49FB-B216-2A08A8949BF1}"/>
     <dgm:cxn modelId="{E65A63D4-959E-4D40-A20D-1AC78881CAC2}" type="presOf" srcId="{A501B367-66BE-45B7-AC85-9EA28F53BE00}" destId="{56A3BAB8-C607-4CB1-BF6B-DB77080C7495}" srcOrd="0" destOrd="0" presId="urn:microsoft.com/office/officeart/2005/8/layout/orgChart1"/>
     <dgm:cxn modelId="{8598E2D5-8BBC-427B-8615-0A0BDFAD122F}" type="presOf" srcId="{9E381D48-0530-4880-A5EC-4F22EC87DFD1}" destId="{AC0E87A5-89D2-4F91-B027-830D1EB3770A}" srcOrd="0" destOrd="0" presId="urn:microsoft.com/office/officeart/2005/8/layout/orgChart1"/>
-    <dgm:cxn modelId="{A107F3DD-EAE0-45DB-8E72-B6F77FEB9A22}" srcId="{B5720F83-2059-4BD9-91E1-34F32E5CB304}" destId="{8E31F887-63BC-4F13-B78F-89F1F78D84AB}" srcOrd="5" destOrd="0" parTransId="{978B8173-BB9C-45F0-A760-7367B01831FB}" sibTransId="{995BEEFF-D03C-4E13-95FF-7D2CE4EC619F}"/>
+    <dgm:cxn modelId="{A107F3DD-EAE0-45DB-8E72-B6F77FEB9A22}" srcId="{B5720F83-2059-4BD9-91E1-34F32E5CB304}" destId="{8E31F887-63BC-4F13-B78F-89F1F78D84AB}" srcOrd="4" destOrd="0" parTransId="{978B8173-BB9C-45F0-A760-7367B01831FB}" sibTransId="{995BEEFF-D03C-4E13-95FF-7D2CE4EC619F}"/>
     <dgm:cxn modelId="{34B90DDE-863E-466B-A7E7-05CB35FE56DB}" type="presOf" srcId="{A778A49F-FE84-4B34-89B6-E8A045B700F2}" destId="{0D2CACAD-D4F2-456A-A6EE-B6D9FB67F59C}" srcOrd="1" destOrd="0" presId="urn:microsoft.com/office/officeart/2005/8/layout/orgChart1"/>
     <dgm:cxn modelId="{32274CDE-DFEB-4A6C-8ABF-658AAC478F44}" type="presOf" srcId="{8873C710-6C9D-49CA-A82F-CA6366DBC195}" destId="{C72BAC93-FBFD-4E31-A280-E636FF5744DE}" srcOrd="1" destOrd="0" presId="urn:microsoft.com/office/officeart/2005/8/layout/orgChart1"/>
     <dgm:cxn modelId="{0AAE00E3-9C49-4404-B724-C161B2B6603F}" type="presOf" srcId="{752606F1-13CB-4F46-9004-36998FC79239}" destId="{61CA32C5-8119-4B43-BC4C-5464E8B67614}" srcOrd="1" destOrd="0" presId="urn:microsoft.com/office/officeart/2005/8/layout/orgChart1"/>
     <dgm:cxn modelId="{377407E5-00D0-4C06-99EE-474D8F7A265E}" type="presOf" srcId="{B33F8F8B-9529-4776-AA67-AB17FA92F5F2}" destId="{2E8FA3E2-A375-4926-A853-AF9A7D0DE5F5}" srcOrd="1" destOrd="0" presId="urn:microsoft.com/office/officeart/2005/8/layout/orgChart1"/>
     <dgm:cxn modelId="{2BDA60E5-6859-48A2-B971-7D4C15E43B6A}" srcId="{B5720F83-2059-4BD9-91E1-34F32E5CB304}" destId="{C2C95360-4E0F-4BAE-92E7-C888B269E4D1}" srcOrd="1" destOrd="0" parTransId="{B54B09A1-4CFE-4869-9C1A-390E4640E116}" sibTransId="{4494A924-B3E1-4A80-B4CD-7C0BE361932E}"/>
-    <dgm:cxn modelId="{F8298EE6-32C6-45A1-99DB-1EFE2636057D}" srcId="{B5720F83-2059-4BD9-91E1-34F32E5CB304}" destId="{3DF92B69-EA72-42DB-919A-39EE9C7F5601}" srcOrd="6" destOrd="0" parTransId="{1814F7F7-10F8-46DC-B374-5A65873E2813}" sibTransId="{B6746CBF-B7C8-4057-87FB-EAAFD92DD04E}"/>
+    <dgm:cxn modelId="{F8298EE6-32C6-45A1-99DB-1EFE2636057D}" srcId="{B5720F83-2059-4BD9-91E1-34F32E5CB304}" destId="{3DF92B69-EA72-42DB-919A-39EE9C7F5601}" srcOrd="5" destOrd="0" parTransId="{1814F7F7-10F8-46DC-B374-5A65873E2813}" sibTransId="{B6746CBF-B7C8-4057-87FB-EAAFD92DD04E}"/>
     <dgm:cxn modelId="{D93CE1E7-4F21-4D07-8206-D531A2161A52}" type="presOf" srcId="{56E4E874-A403-4372-8362-3C5B550269EB}" destId="{EA31EAA2-8FD1-48BE-AD0D-DD4F42FDC50A}" srcOrd="0" destOrd="0" presId="urn:microsoft.com/office/officeart/2005/8/layout/orgChart1"/>
     <dgm:cxn modelId="{642490E9-199B-4F0D-8288-283664E1F936}" srcId="{A778A49F-FE84-4B34-89B6-E8A045B700F2}" destId="{4A39742E-1493-4DCE-955B-B9A44E2FF975}" srcOrd="1" destOrd="0" parTransId="{0F4E0B57-0F30-404F-A40B-B0F498924B71}" sibTransId="{8D11B0DD-6B81-43EE-BEBC-B6E469ED921E}"/>
     <dgm:cxn modelId="{68D06EEB-89CE-46A2-B241-10722197E21A}" srcId="{A778A49F-FE84-4B34-89B6-E8A045B700F2}" destId="{5D37E786-0631-48CD-B528-DEE4EED251A4}" srcOrd="0" destOrd="0" parTransId="{D48A2EFD-E369-43D7-8DD8-9C2D2CC910CC}" sibTransId="{2F5F7757-7E79-401A-9965-2C7E295D7A81}"/>
     <dgm:cxn modelId="{1E837BED-3F2A-4335-BADE-E82DA3160863}" type="presOf" srcId="{1B253C7D-EB20-477C-AEE4-C78EC91813A0}" destId="{EB179761-8B3B-4EB9-9EA1-D84BC7D38023}" srcOrd="0" destOrd="0" presId="urn:microsoft.com/office/officeart/2005/8/layout/orgChart1"/>
-    <dgm:cxn modelId="{4FB677F0-6B65-412E-A792-1FEF7FC069F5}" type="presOf" srcId="{77AF0B6E-BD97-4C8F-AF92-5BA948A731BD}" destId="{8BA562D8-DC7C-424D-9797-DD3F3C147DA2}" srcOrd="0" destOrd="0" presId="urn:microsoft.com/office/officeart/2005/8/layout/orgChart1"/>
     <dgm:cxn modelId="{95F778F0-1147-4A17-9945-E6F6AF9B816A}" type="presOf" srcId="{CE36DE27-0DEA-41DE-BBC2-304F8A895969}" destId="{A4526223-F200-4B5A-B974-2310A876DD3B}" srcOrd="1" destOrd="0" presId="urn:microsoft.com/office/officeart/2005/8/layout/orgChart1"/>
-    <dgm:cxn modelId="{C3E199F0-0A4C-431C-81FD-8FF0DEA1FBB1}" srcId="{B5720F83-2059-4BD9-91E1-34F32E5CB304}" destId="{77AF0B6E-BD97-4C8F-AF92-5BA948A731BD}" srcOrd="2" destOrd="0" parTransId="{790D96E9-46AF-4A3B-A2D3-A6B0E4575C26}" sibTransId="{E4E1D852-AB88-48CF-9022-06C505511263}"/>
     <dgm:cxn modelId="{431611FD-DFA3-4551-BD9D-B1DD9E3054EA}" type="presOf" srcId="{A778A49F-FE84-4B34-89B6-E8A045B700F2}" destId="{035F586F-77DB-4363-B3F5-5DA36B444564}" srcOrd="0" destOrd="0" presId="urn:microsoft.com/office/officeart/2005/8/layout/orgChart1"/>
-    <dgm:cxn modelId="{C7AEEAFE-74CE-4483-8A51-F1B58BE5A47F}" srcId="{B5720F83-2059-4BD9-91E1-34F32E5CB304}" destId="{4E05081A-FC1E-428A-AF32-32329BFE5A32}" srcOrd="4" destOrd="0" parTransId="{42221733-6F22-4E2A-91A8-9697A3A98043}" sibTransId="{12BBCF77-0BD7-4191-B9C0-DDE47272DDFF}"/>
+    <dgm:cxn modelId="{C7AEEAFE-74CE-4483-8A51-F1B58BE5A47F}" srcId="{B5720F83-2059-4BD9-91E1-34F32E5CB304}" destId="{4E05081A-FC1E-428A-AF32-32329BFE5A32}" srcOrd="3" destOrd="0" parTransId="{42221733-6F22-4E2A-91A8-9697A3A98043}" sibTransId="{12BBCF77-0BD7-4191-B9C0-DDE47272DDFF}"/>
     <dgm:cxn modelId="{0815B257-04C0-4BC1-BFE8-82F55A74290D}" type="presParOf" srcId="{70FE5A25-E2A2-4C72-AC06-D09221AB8C88}" destId="{810D432D-BB14-402A-9881-3E0C42E3D1F2}" srcOrd="0" destOrd="0" presId="urn:microsoft.com/office/officeart/2005/8/layout/orgChart1"/>
     <dgm:cxn modelId="{AADB8105-AE36-427E-B9A0-5924D37A3D72}" type="presParOf" srcId="{810D432D-BB14-402A-9881-3E0C42E3D1F2}" destId="{CE912B89-3AC8-41D7-AC62-0C456C224FB5}" srcOrd="0" destOrd="0" presId="urn:microsoft.com/office/officeart/2005/8/layout/orgChart1"/>
     <dgm:cxn modelId="{880FCED1-FFCD-4A7E-8AF9-590F7A45B490}" type="presParOf" srcId="{CE912B89-3AC8-41D7-AC62-0C456C224FB5}" destId="{B1C0BB44-8990-4179-B9B3-CE0750374B87}" srcOrd="0" destOrd="0" presId="urn:microsoft.com/office/officeart/2005/8/layout/orgChart1"/>
@@ -3635,36 +3482,29 @@
     <dgm:cxn modelId="{54550F62-8A79-4B90-B631-F9956F4B0DCB}" type="presParOf" srcId="{3662E62B-BD00-409E-8AB7-D667ECFE4896}" destId="{29906AE5-B64E-476B-92B1-D70C85D753E5}" srcOrd="1" destOrd="0" presId="urn:microsoft.com/office/officeart/2005/8/layout/orgChart1"/>
     <dgm:cxn modelId="{525468FD-D94A-41AE-A2F3-ACBD03BB509A}" type="presParOf" srcId="{3662E62B-BD00-409E-8AB7-D667ECFE4896}" destId="{0383B109-D53C-42EE-B0BB-B82BA0A02475}" srcOrd="2" destOrd="0" presId="urn:microsoft.com/office/officeart/2005/8/layout/orgChart1"/>
     <dgm:cxn modelId="{11D0D57C-97B1-41A9-9541-349560ACF72C}" type="presParOf" srcId="{70FCEA70-D7B2-41E5-8D6D-3829EB2E88A8}" destId="{7E6D74B5-E8F0-43A7-A408-1A048256E023}" srcOrd="2" destOrd="0" presId="urn:microsoft.com/office/officeart/2005/8/layout/orgChart1"/>
-    <dgm:cxn modelId="{296449FA-2C73-42AD-ADB8-5FA0144CE7C5}" type="presParOf" srcId="{3A54B15F-4576-491F-BBC6-2D5EF7E874BC}" destId="{ADFD04E9-E27B-43C8-B910-7FB1EC572950}" srcOrd="4" destOrd="0" presId="urn:microsoft.com/office/officeart/2005/8/layout/orgChart1"/>
-    <dgm:cxn modelId="{CD2BE952-D09E-42AE-8B91-4B6AA0C57AF8}" type="presParOf" srcId="{3A54B15F-4576-491F-BBC6-2D5EF7E874BC}" destId="{9A360762-127E-4CC8-B3A9-4BDEDB8E4B71}" srcOrd="5" destOrd="0" presId="urn:microsoft.com/office/officeart/2005/8/layout/orgChart1"/>
-    <dgm:cxn modelId="{97A9A472-C2A0-4580-9C00-354E3FBA1C16}" type="presParOf" srcId="{9A360762-127E-4CC8-B3A9-4BDEDB8E4B71}" destId="{D469E816-524C-4199-A11C-6330429ABA4C}" srcOrd="0" destOrd="0" presId="urn:microsoft.com/office/officeart/2005/8/layout/orgChart1"/>
-    <dgm:cxn modelId="{C5876870-4DFD-4F6F-91C6-69B3E2F4BFC9}" type="presParOf" srcId="{D469E816-524C-4199-A11C-6330429ABA4C}" destId="{8BA562D8-DC7C-424D-9797-DD3F3C147DA2}" srcOrd="0" destOrd="0" presId="urn:microsoft.com/office/officeart/2005/8/layout/orgChart1"/>
-    <dgm:cxn modelId="{649E8C03-CB33-4D5F-BC92-7BDD1C419186}" type="presParOf" srcId="{D469E816-524C-4199-A11C-6330429ABA4C}" destId="{9C05F8D8-C192-487B-A4F5-E74AB9FAD369}" srcOrd="1" destOrd="0" presId="urn:microsoft.com/office/officeart/2005/8/layout/orgChart1"/>
-    <dgm:cxn modelId="{BA41ABF6-5B0B-4915-A648-BED801385FF7}" type="presParOf" srcId="{9A360762-127E-4CC8-B3A9-4BDEDB8E4B71}" destId="{642E2F6D-2B77-44BE-A1FA-FB1A525D4C7A}" srcOrd="1" destOrd="0" presId="urn:microsoft.com/office/officeart/2005/8/layout/orgChart1"/>
-    <dgm:cxn modelId="{F508A4C9-78CB-46D9-8E55-278BF03B0B04}" type="presParOf" srcId="{9A360762-127E-4CC8-B3A9-4BDEDB8E4B71}" destId="{86482EF9-4C45-40B2-81E0-DC75C1223578}" srcOrd="2" destOrd="0" presId="urn:microsoft.com/office/officeart/2005/8/layout/orgChart1"/>
-    <dgm:cxn modelId="{2B441189-14D6-436E-9BFF-473BC870B69D}" type="presParOf" srcId="{3A54B15F-4576-491F-BBC6-2D5EF7E874BC}" destId="{F77C2B19-2A94-47E3-8D6C-EBC149703009}" srcOrd="6" destOrd="0" presId="urn:microsoft.com/office/officeart/2005/8/layout/orgChart1"/>
-    <dgm:cxn modelId="{67BBEC66-96C1-4196-9890-DD70674B50B3}" type="presParOf" srcId="{3A54B15F-4576-491F-BBC6-2D5EF7E874BC}" destId="{7AEAB02B-19AE-460F-9814-FF450131A8E4}" srcOrd="7" destOrd="0" presId="urn:microsoft.com/office/officeart/2005/8/layout/orgChart1"/>
+    <dgm:cxn modelId="{2B441189-14D6-436E-9BFF-473BC870B69D}" type="presParOf" srcId="{3A54B15F-4576-491F-BBC6-2D5EF7E874BC}" destId="{F77C2B19-2A94-47E3-8D6C-EBC149703009}" srcOrd="4" destOrd="0" presId="urn:microsoft.com/office/officeart/2005/8/layout/orgChart1"/>
+    <dgm:cxn modelId="{67BBEC66-96C1-4196-9890-DD70674B50B3}" type="presParOf" srcId="{3A54B15F-4576-491F-BBC6-2D5EF7E874BC}" destId="{7AEAB02B-19AE-460F-9814-FF450131A8E4}" srcOrd="5" destOrd="0" presId="urn:microsoft.com/office/officeart/2005/8/layout/orgChart1"/>
     <dgm:cxn modelId="{5D48A2D4-CADA-4291-9326-62F4B0B6E920}" type="presParOf" srcId="{7AEAB02B-19AE-460F-9814-FF450131A8E4}" destId="{7D68B55E-1774-454C-87F4-5B0FDD2AEED8}" srcOrd="0" destOrd="0" presId="urn:microsoft.com/office/officeart/2005/8/layout/orgChart1"/>
     <dgm:cxn modelId="{4A51851F-436D-49F5-89CA-9158EFD42B6E}" type="presParOf" srcId="{7D68B55E-1774-454C-87F4-5B0FDD2AEED8}" destId="{DB382909-05C0-478F-8EDC-74E6252E2D80}" srcOrd="0" destOrd="0" presId="urn:microsoft.com/office/officeart/2005/8/layout/orgChart1"/>
     <dgm:cxn modelId="{26CAC18E-F754-46FF-B082-B0D76B4AC5A2}" type="presParOf" srcId="{7D68B55E-1774-454C-87F4-5B0FDD2AEED8}" destId="{B5545EE2-52F5-4176-888E-BDADFB004E5A}" srcOrd="1" destOrd="0" presId="urn:microsoft.com/office/officeart/2005/8/layout/orgChart1"/>
     <dgm:cxn modelId="{162295A1-A031-4FB3-A7B7-A83FE89F8D2D}" type="presParOf" srcId="{7AEAB02B-19AE-460F-9814-FF450131A8E4}" destId="{F7022938-B6AC-46C2-86E5-B4CDC8C46586}" srcOrd="1" destOrd="0" presId="urn:microsoft.com/office/officeart/2005/8/layout/orgChart1"/>
     <dgm:cxn modelId="{BF63CBBA-345E-47C5-80A1-3D808B919244}" type="presParOf" srcId="{7AEAB02B-19AE-460F-9814-FF450131A8E4}" destId="{F379F23F-4DAB-41E0-8952-B5C1B30D3E05}" srcOrd="2" destOrd="0" presId="urn:microsoft.com/office/officeart/2005/8/layout/orgChart1"/>
-    <dgm:cxn modelId="{C999157B-4E01-48A2-B039-2F878481D804}" type="presParOf" srcId="{3A54B15F-4576-491F-BBC6-2D5EF7E874BC}" destId="{5F47D231-787A-4620-90EA-300798B8EA95}" srcOrd="8" destOrd="0" presId="urn:microsoft.com/office/officeart/2005/8/layout/orgChart1"/>
-    <dgm:cxn modelId="{F459C877-A246-4241-AE9B-74CF9EE83E74}" type="presParOf" srcId="{3A54B15F-4576-491F-BBC6-2D5EF7E874BC}" destId="{D8EADA65-4D4C-4B75-BDAC-86955112BDF1}" srcOrd="9" destOrd="0" presId="urn:microsoft.com/office/officeart/2005/8/layout/orgChart1"/>
+    <dgm:cxn modelId="{C999157B-4E01-48A2-B039-2F878481D804}" type="presParOf" srcId="{3A54B15F-4576-491F-BBC6-2D5EF7E874BC}" destId="{5F47D231-787A-4620-90EA-300798B8EA95}" srcOrd="6" destOrd="0" presId="urn:microsoft.com/office/officeart/2005/8/layout/orgChart1"/>
+    <dgm:cxn modelId="{F459C877-A246-4241-AE9B-74CF9EE83E74}" type="presParOf" srcId="{3A54B15F-4576-491F-BBC6-2D5EF7E874BC}" destId="{D8EADA65-4D4C-4B75-BDAC-86955112BDF1}" srcOrd="7" destOrd="0" presId="urn:microsoft.com/office/officeart/2005/8/layout/orgChart1"/>
     <dgm:cxn modelId="{5454BA6A-8A1A-43A1-A209-DE04EC820E31}" type="presParOf" srcId="{D8EADA65-4D4C-4B75-BDAC-86955112BDF1}" destId="{A41B80F2-FA5C-4807-8A0F-541336B30B24}" srcOrd="0" destOrd="0" presId="urn:microsoft.com/office/officeart/2005/8/layout/orgChart1"/>
     <dgm:cxn modelId="{9949D0C3-44E8-4104-A08B-44500E260C43}" type="presParOf" srcId="{A41B80F2-FA5C-4807-8A0F-541336B30B24}" destId="{5746B83C-5D69-42C5-8889-FAE289074D20}" srcOrd="0" destOrd="0" presId="urn:microsoft.com/office/officeart/2005/8/layout/orgChart1"/>
     <dgm:cxn modelId="{60C0F5BF-086E-48F1-A7F5-F0B2A8578D7E}" type="presParOf" srcId="{A41B80F2-FA5C-4807-8A0F-541336B30B24}" destId="{7349AF61-A045-4F03-B0E6-01A273533202}" srcOrd="1" destOrd="0" presId="urn:microsoft.com/office/officeart/2005/8/layout/orgChart1"/>
     <dgm:cxn modelId="{26E49443-D331-4496-B064-D3D2E59AE97C}" type="presParOf" srcId="{D8EADA65-4D4C-4B75-BDAC-86955112BDF1}" destId="{F31F0BA7-586F-4117-8CAF-A8E4A3E92E34}" srcOrd="1" destOrd="0" presId="urn:microsoft.com/office/officeart/2005/8/layout/orgChart1"/>
     <dgm:cxn modelId="{D1957AB5-C459-40EE-9842-7C7088EE7EB4}" type="presParOf" srcId="{D8EADA65-4D4C-4B75-BDAC-86955112BDF1}" destId="{F7210A8C-E4E8-42B6-8999-FEF61306DD83}" srcOrd="2" destOrd="0" presId="urn:microsoft.com/office/officeart/2005/8/layout/orgChart1"/>
-    <dgm:cxn modelId="{7FD99B7E-14BC-4771-989D-70B1C761A66B}" type="presParOf" srcId="{3A54B15F-4576-491F-BBC6-2D5EF7E874BC}" destId="{7A4B89B8-8725-4F4E-8A8B-755EE4D4857D}" srcOrd="10" destOrd="0" presId="urn:microsoft.com/office/officeart/2005/8/layout/orgChart1"/>
-    <dgm:cxn modelId="{938A5EBE-CD67-458F-9F48-817F6F174E5C}" type="presParOf" srcId="{3A54B15F-4576-491F-BBC6-2D5EF7E874BC}" destId="{9D76218B-72BE-4A9B-86DC-BF65C57E60A3}" srcOrd="11" destOrd="0" presId="urn:microsoft.com/office/officeart/2005/8/layout/orgChart1"/>
+    <dgm:cxn modelId="{7FD99B7E-14BC-4771-989D-70B1C761A66B}" type="presParOf" srcId="{3A54B15F-4576-491F-BBC6-2D5EF7E874BC}" destId="{7A4B89B8-8725-4F4E-8A8B-755EE4D4857D}" srcOrd="8" destOrd="0" presId="urn:microsoft.com/office/officeart/2005/8/layout/orgChart1"/>
+    <dgm:cxn modelId="{938A5EBE-CD67-458F-9F48-817F6F174E5C}" type="presParOf" srcId="{3A54B15F-4576-491F-BBC6-2D5EF7E874BC}" destId="{9D76218B-72BE-4A9B-86DC-BF65C57E60A3}" srcOrd="9" destOrd="0" presId="urn:microsoft.com/office/officeart/2005/8/layout/orgChart1"/>
     <dgm:cxn modelId="{AF909138-5D45-4BAB-A047-3F9C4F3955C7}" type="presParOf" srcId="{9D76218B-72BE-4A9B-86DC-BF65C57E60A3}" destId="{54AF1629-5528-4ACB-BFCA-7F8CC462F0E6}" srcOrd="0" destOrd="0" presId="urn:microsoft.com/office/officeart/2005/8/layout/orgChart1"/>
     <dgm:cxn modelId="{085935A1-0EDD-49C6-9462-F6889F35DCE3}" type="presParOf" srcId="{54AF1629-5528-4ACB-BFCA-7F8CC462F0E6}" destId="{E911C1DE-D631-47A5-AD0B-1CBECFF8B70C}" srcOrd="0" destOrd="0" presId="urn:microsoft.com/office/officeart/2005/8/layout/orgChart1"/>
     <dgm:cxn modelId="{D74A0656-FCF1-44A9-A5B4-58E2EFF891A6}" type="presParOf" srcId="{54AF1629-5528-4ACB-BFCA-7F8CC462F0E6}" destId="{11D33C27-387D-4153-9AD3-21C625F4CAD9}" srcOrd="1" destOrd="0" presId="urn:microsoft.com/office/officeart/2005/8/layout/orgChart1"/>
     <dgm:cxn modelId="{66EB8460-52B6-4837-B78C-3C3B34DFADA1}" type="presParOf" srcId="{9D76218B-72BE-4A9B-86DC-BF65C57E60A3}" destId="{27EB8EDE-7CB9-4437-89FD-4D2357F1D352}" srcOrd="1" destOrd="0" presId="urn:microsoft.com/office/officeart/2005/8/layout/orgChart1"/>
     <dgm:cxn modelId="{3360C6F9-6C7D-4043-B131-568216840292}" type="presParOf" srcId="{9D76218B-72BE-4A9B-86DC-BF65C57E60A3}" destId="{509DA6C6-D064-4147-8A11-FFB1C424EA07}" srcOrd="2" destOrd="0" presId="urn:microsoft.com/office/officeart/2005/8/layout/orgChart1"/>
-    <dgm:cxn modelId="{81F00307-1E5B-4888-A417-877E616019E2}" type="presParOf" srcId="{3A54B15F-4576-491F-BBC6-2D5EF7E874BC}" destId="{2283A390-88DD-4FB6-B85C-86AAAF55BA89}" srcOrd="12" destOrd="0" presId="urn:microsoft.com/office/officeart/2005/8/layout/orgChart1"/>
-    <dgm:cxn modelId="{FE4113CD-1D6B-4627-9FB2-AF5BEC422B7B}" type="presParOf" srcId="{3A54B15F-4576-491F-BBC6-2D5EF7E874BC}" destId="{B0392D86-5E2C-45CC-8F38-D475D6CFE907}" srcOrd="13" destOrd="0" presId="urn:microsoft.com/office/officeart/2005/8/layout/orgChart1"/>
+    <dgm:cxn modelId="{81F00307-1E5B-4888-A417-877E616019E2}" type="presParOf" srcId="{3A54B15F-4576-491F-BBC6-2D5EF7E874BC}" destId="{2283A390-88DD-4FB6-B85C-86AAAF55BA89}" srcOrd="10" destOrd="0" presId="urn:microsoft.com/office/officeart/2005/8/layout/orgChart1"/>
+    <dgm:cxn modelId="{FE4113CD-1D6B-4627-9FB2-AF5BEC422B7B}" type="presParOf" srcId="{3A54B15F-4576-491F-BBC6-2D5EF7E874BC}" destId="{B0392D86-5E2C-45CC-8F38-D475D6CFE907}" srcOrd="11" destOrd="0" presId="urn:microsoft.com/office/officeart/2005/8/layout/orgChart1"/>
     <dgm:cxn modelId="{430582BC-F689-46AC-99F6-D898002A3972}" type="presParOf" srcId="{B0392D86-5E2C-45CC-8F38-D475D6CFE907}" destId="{F840A006-6502-45D9-88B4-C5173E6D11A3}" srcOrd="0" destOrd="0" presId="urn:microsoft.com/office/officeart/2005/8/layout/orgChart1"/>
     <dgm:cxn modelId="{6DA8D961-170F-4225-9D5D-DE074DE881D8}" type="presParOf" srcId="{F840A006-6502-45D9-88B4-C5173E6D11A3}" destId="{6387E1E4-2E36-41AC-8665-DA093ADD23CD}" srcOrd="0" destOrd="0" presId="urn:microsoft.com/office/officeart/2005/8/layout/orgChart1"/>
     <dgm:cxn modelId="{85F98F6A-AE86-4E0E-9C40-E944D49750AD}" type="presParOf" srcId="{F840A006-6502-45D9-88B4-C5173E6D11A3}" destId="{70FB7394-E37A-4533-8FA5-378EAFD40FEF}" srcOrd="1" destOrd="0" presId="urn:microsoft.com/office/officeart/2005/8/layout/orgChart1"/>
@@ -3683,23 +3523,16 @@
     <dgm:cxn modelId="{39E9AFDA-5CBF-43D4-8E12-1EF64E2D8D4D}" type="presParOf" srcId="{E3FE3F6B-A6F9-4F12-BFB9-6DE3AD20F1F0}" destId="{50F1C57E-3227-49C0-972A-DD26870D189C}" srcOrd="1" destOrd="0" presId="urn:microsoft.com/office/officeart/2005/8/layout/orgChart1"/>
     <dgm:cxn modelId="{EA624B5B-1E0A-440E-AD8E-1B8CAF437D75}" type="presParOf" srcId="{DC388750-29B5-4DC4-8AE1-DD92C6F7E970}" destId="{102A8C6F-7EAE-44EA-AEB1-C7F852612F35}" srcOrd="1" destOrd="0" presId="urn:microsoft.com/office/officeart/2005/8/layout/orgChart1"/>
     <dgm:cxn modelId="{671A7C8D-BEBF-4C36-8DC6-9C9F185A61F7}" type="presParOf" srcId="{DC388750-29B5-4DC4-8AE1-DD92C6F7E970}" destId="{5B69A16D-0B70-44EA-963D-C8E795D948B7}" srcOrd="2" destOrd="0" presId="urn:microsoft.com/office/officeart/2005/8/layout/orgChart1"/>
-    <dgm:cxn modelId="{0873F737-12B3-4568-8C5F-3AEF7C68BE80}" type="presParOf" srcId="{D6B88F4D-742C-492E-AD08-47E2A4E3A728}" destId="{0BD1F90B-CDF2-4C59-9720-A983E71C4563}" srcOrd="4" destOrd="0" presId="urn:microsoft.com/office/officeart/2005/8/layout/orgChart1"/>
-    <dgm:cxn modelId="{D77A451A-997C-41A5-942E-5C0666A70574}" type="presParOf" srcId="{D6B88F4D-742C-492E-AD08-47E2A4E3A728}" destId="{FFCB62BC-396B-4019-9B18-0DD07BD94690}" srcOrd="5" destOrd="0" presId="urn:microsoft.com/office/officeart/2005/8/layout/orgChart1"/>
-    <dgm:cxn modelId="{D7EEE2B6-5D87-44A6-9D13-ED101A96A266}" type="presParOf" srcId="{FFCB62BC-396B-4019-9B18-0DD07BD94690}" destId="{93320B2F-7EFA-4F16-A457-433F59E00A8D}" srcOrd="0" destOrd="0" presId="urn:microsoft.com/office/officeart/2005/8/layout/orgChart1"/>
-    <dgm:cxn modelId="{EA86CDF3-D5A5-4AD9-BE08-8E5AA8C4AC2D}" type="presParOf" srcId="{93320B2F-7EFA-4F16-A457-433F59E00A8D}" destId="{9E7841B2-EBAD-4701-890D-0C1033E70FDA}" srcOrd="0" destOrd="0" presId="urn:microsoft.com/office/officeart/2005/8/layout/orgChart1"/>
-    <dgm:cxn modelId="{A07F5AE4-BCF3-4834-96FF-A71C1E5753BA}" type="presParOf" srcId="{93320B2F-7EFA-4F16-A457-433F59E00A8D}" destId="{1F94D6CF-35E1-4E7C-8006-6B6579BF3FB3}" srcOrd="1" destOrd="0" presId="urn:microsoft.com/office/officeart/2005/8/layout/orgChart1"/>
-    <dgm:cxn modelId="{3AD13215-32BC-454C-BA7C-3DF1BEFDABB1}" type="presParOf" srcId="{FFCB62BC-396B-4019-9B18-0DD07BD94690}" destId="{03FD4BC4-DEF4-49A5-A8C3-E16A29AA01F8}" srcOrd="1" destOrd="0" presId="urn:microsoft.com/office/officeart/2005/8/layout/orgChart1"/>
-    <dgm:cxn modelId="{0F417AC8-10DF-46D6-9673-5CA2EE0ABE30}" type="presParOf" srcId="{FFCB62BC-396B-4019-9B18-0DD07BD94690}" destId="{E0DC56F0-7B27-4877-80A1-B94ADE8A8727}" srcOrd="2" destOrd="0" presId="urn:microsoft.com/office/officeart/2005/8/layout/orgChart1"/>
     <dgm:cxn modelId="{23AD67F0-5C03-4618-9F64-DA10D4D213DE}" type="presParOf" srcId="{B0392D86-5E2C-45CC-8F38-D475D6CFE907}" destId="{008A3A30-ACD0-467B-86A3-1AFE02E94782}" srcOrd="2" destOrd="0" presId="urn:microsoft.com/office/officeart/2005/8/layout/orgChart1"/>
-    <dgm:cxn modelId="{CAFF307F-7C09-4ADA-BB25-76E36978791E}" type="presParOf" srcId="{3A54B15F-4576-491F-BBC6-2D5EF7E874BC}" destId="{FA44FF64-0A9C-4CC7-9A79-1F7CEF1CECCC}" srcOrd="14" destOrd="0" presId="urn:microsoft.com/office/officeart/2005/8/layout/orgChart1"/>
-    <dgm:cxn modelId="{213A11B3-F7B4-4CFE-88E5-650CC104F7EC}" type="presParOf" srcId="{3A54B15F-4576-491F-BBC6-2D5EF7E874BC}" destId="{604EC9BF-20D0-40E1-A358-4E642361B4E6}" srcOrd="15" destOrd="0" presId="urn:microsoft.com/office/officeart/2005/8/layout/orgChart1"/>
+    <dgm:cxn modelId="{CAFF307F-7C09-4ADA-BB25-76E36978791E}" type="presParOf" srcId="{3A54B15F-4576-491F-BBC6-2D5EF7E874BC}" destId="{FA44FF64-0A9C-4CC7-9A79-1F7CEF1CECCC}" srcOrd="12" destOrd="0" presId="urn:microsoft.com/office/officeart/2005/8/layout/orgChart1"/>
+    <dgm:cxn modelId="{213A11B3-F7B4-4CFE-88E5-650CC104F7EC}" type="presParOf" srcId="{3A54B15F-4576-491F-BBC6-2D5EF7E874BC}" destId="{604EC9BF-20D0-40E1-A358-4E642361B4E6}" srcOrd="13" destOrd="0" presId="urn:microsoft.com/office/officeart/2005/8/layout/orgChart1"/>
     <dgm:cxn modelId="{1C1314BC-03B7-4867-BD33-FCAA2730C653}" type="presParOf" srcId="{604EC9BF-20D0-40E1-A358-4E642361B4E6}" destId="{CF81A7DE-4862-45C0-B537-4B59E2607ABC}" srcOrd="0" destOrd="0" presId="urn:microsoft.com/office/officeart/2005/8/layout/orgChart1"/>
     <dgm:cxn modelId="{3F008430-F1DC-4A12-AFDF-AF91262B2DE5}" type="presParOf" srcId="{CF81A7DE-4862-45C0-B537-4B59E2607ABC}" destId="{48346BFF-0CEE-4005-8D91-4DCD324957F4}" srcOrd="0" destOrd="0" presId="urn:microsoft.com/office/officeart/2005/8/layout/orgChart1"/>
     <dgm:cxn modelId="{8430B5C0-4950-4571-9362-6A3FEBD59697}" type="presParOf" srcId="{CF81A7DE-4862-45C0-B537-4B59E2607ABC}" destId="{1B1C5A4E-7BD7-4E8B-BB88-B3CBF4E1B489}" srcOrd="1" destOrd="0" presId="urn:microsoft.com/office/officeart/2005/8/layout/orgChart1"/>
     <dgm:cxn modelId="{2B16BABA-0C86-43D5-8D4D-38537F39C41E}" type="presParOf" srcId="{604EC9BF-20D0-40E1-A358-4E642361B4E6}" destId="{CE76534F-34B9-4AE5-B465-DAB80E8F3693}" srcOrd="1" destOrd="0" presId="urn:microsoft.com/office/officeart/2005/8/layout/orgChart1"/>
     <dgm:cxn modelId="{CD2A4F15-5D92-432E-8B75-357ABC6695CE}" type="presParOf" srcId="{604EC9BF-20D0-40E1-A358-4E642361B4E6}" destId="{9275C8D0-5A5E-4B5C-AD97-3A55C9DB8223}" srcOrd="2" destOrd="0" presId="urn:microsoft.com/office/officeart/2005/8/layout/orgChart1"/>
-    <dgm:cxn modelId="{4B6943B6-99D0-4E45-8BCA-B4EDE90B73D0}" type="presParOf" srcId="{3A54B15F-4576-491F-BBC6-2D5EF7E874BC}" destId="{B150B2DE-85D9-429C-B196-61C30597AF65}" srcOrd="16" destOrd="0" presId="urn:microsoft.com/office/officeart/2005/8/layout/orgChart1"/>
-    <dgm:cxn modelId="{AD5DD819-0839-47AF-A176-607714F3912B}" type="presParOf" srcId="{3A54B15F-4576-491F-BBC6-2D5EF7E874BC}" destId="{7BF6E57F-A3B6-49B6-A35A-97CE281DFCCD}" srcOrd="17" destOrd="0" presId="urn:microsoft.com/office/officeart/2005/8/layout/orgChart1"/>
+    <dgm:cxn modelId="{4B6943B6-99D0-4E45-8BCA-B4EDE90B73D0}" type="presParOf" srcId="{3A54B15F-4576-491F-BBC6-2D5EF7E874BC}" destId="{B150B2DE-85D9-429C-B196-61C30597AF65}" srcOrd="14" destOrd="0" presId="urn:microsoft.com/office/officeart/2005/8/layout/orgChart1"/>
+    <dgm:cxn modelId="{AD5DD819-0839-47AF-A176-607714F3912B}" type="presParOf" srcId="{3A54B15F-4576-491F-BBC6-2D5EF7E874BC}" destId="{7BF6E57F-A3B6-49B6-A35A-97CE281DFCCD}" srcOrd="15" destOrd="0" presId="urn:microsoft.com/office/officeart/2005/8/layout/orgChart1"/>
     <dgm:cxn modelId="{EDBE195B-8FC2-4332-B87B-88DDD0962E17}" type="presParOf" srcId="{7BF6E57F-A3B6-49B6-A35A-97CE281DFCCD}" destId="{6F8A8D64-F97D-45A8-B547-5A75771D4F21}" srcOrd="0" destOrd="0" presId="urn:microsoft.com/office/officeart/2005/8/layout/orgChart1"/>
     <dgm:cxn modelId="{44EA43DB-A289-48C1-9027-0F3DF4390C7E}" type="presParOf" srcId="{6F8A8D64-F97D-45A8-B547-5A75771D4F21}" destId="{56A3BAB8-C607-4CB1-BF6B-DB77080C7495}" srcOrd="0" destOrd="0" presId="urn:microsoft.com/office/officeart/2005/8/layout/orgChart1"/>
     <dgm:cxn modelId="{73664200-0FE2-4417-AAF8-7D4A4A7CB9AA}" type="presParOf" srcId="{6F8A8D64-F97D-45A8-B547-5A75771D4F21}" destId="{A92DC098-F82F-4FD2-9196-7441FCB19036}" srcOrd="1" destOrd="0" presId="urn:microsoft.com/office/officeart/2005/8/layout/orgChart1"/>
@@ -3739,8 +3572,8 @@
       </dsp:nvSpPr>
       <dsp:spPr>
         <a:xfrm>
-          <a:off x="4326934" y="924103"/>
-          <a:ext cx="4044853" cy="455374"/>
+          <a:off x="4321639" y="731253"/>
+          <a:ext cx="4011564" cy="507440"/>
         </a:xfrm>
         <a:custGeom>
           <a:avLst/>
@@ -3754,13 +3587,13 @@
                 <a:pt x="0" y="0"/>
               </a:moveTo>
               <a:lnTo>
-                <a:pt x="0" y="378160"/>
+                <a:pt x="0" y="421398"/>
               </a:lnTo>
               <a:lnTo>
-                <a:pt x="4044853" y="378160"/>
+                <a:pt x="4011564" y="421398"/>
               </a:lnTo>
               <a:lnTo>
-                <a:pt x="4044853" y="455374"/>
+                <a:pt x="4011564" y="507440"/>
               </a:lnTo>
             </a:path>
           </a:pathLst>
@@ -3801,8 +3634,8 @@
       </dsp:nvSpPr>
       <dsp:spPr>
         <a:xfrm>
-          <a:off x="4326934" y="924103"/>
-          <a:ext cx="3155056" cy="455374"/>
+          <a:off x="4321639" y="731253"/>
+          <a:ext cx="3020030" cy="507440"/>
         </a:xfrm>
         <a:custGeom>
           <a:avLst/>
@@ -3816,13 +3649,13 @@
                 <a:pt x="0" y="0"/>
               </a:moveTo>
               <a:lnTo>
-                <a:pt x="0" y="378160"/>
+                <a:pt x="0" y="421398"/>
               </a:lnTo>
               <a:lnTo>
-                <a:pt x="3155056" y="378160"/>
+                <a:pt x="3020030" y="421398"/>
               </a:lnTo>
               <a:lnTo>
-                <a:pt x="3155056" y="455374"/>
+                <a:pt x="3020030" y="507440"/>
               </a:lnTo>
             </a:path>
           </a:pathLst>
@@ -3856,15 +3689,15 @@
         <a:fontRef idx="minor"/>
       </dsp:style>
     </dsp:sp>
-    <dsp:sp modelId="{0BD1F90B-CDF2-4C59-9720-A983E71C4563}">
+    <dsp:sp modelId="{BFFDE244-4A16-46EC-B371-1FCE835E28A3}">
       <dsp:nvSpPr>
         <dsp:cNvPr id="0" name=""/>
         <dsp:cNvSpPr/>
       </dsp:nvSpPr>
       <dsp:spPr>
         <a:xfrm>
-          <a:off x="6237103" y="1737448"/>
-          <a:ext cx="120462" cy="1382495"/>
+          <a:off x="5954445" y="1637594"/>
+          <a:ext cx="134235" cy="964029"/>
         </a:xfrm>
         <a:custGeom>
           <a:avLst/>
@@ -3878,69 +3711,10 @@
                 <a:pt x="0" y="0"/>
               </a:moveTo>
               <a:lnTo>
-                <a:pt x="0" y="1382495"/>
+                <a:pt x="0" y="964029"/>
               </a:lnTo>
               <a:lnTo>
-                <a:pt x="120462" y="1382495"/>
-              </a:lnTo>
-            </a:path>
-          </a:pathLst>
-        </a:custGeom>
-        <a:noFill/>
-        <a:ln w="12700" cap="flat" cmpd="sng" algn="ctr">
-          <a:solidFill>
-            <a:schemeClr val="dk2">
-              <a:shade val="80000"/>
-              <a:hueOff val="0"/>
-              <a:satOff val="0"/>
-              <a:lumOff val="0"/>
-              <a:alphaOff val="0"/>
-            </a:schemeClr>
-          </a:solidFill>
-          <a:prstDash val="solid"/>
-          <a:miter lim="800000"/>
-        </a:ln>
-        <a:effectLst/>
-      </dsp:spPr>
-      <dsp:style>
-        <a:lnRef idx="2">
-          <a:scrgbClr r="0" g="0" b="0"/>
-        </a:lnRef>
-        <a:fillRef idx="0">
-          <a:scrgbClr r="0" g="0" b="0"/>
-        </a:fillRef>
-        <a:effectRef idx="0">
-          <a:scrgbClr r="0" g="0" b="0"/>
-        </a:effectRef>
-        <a:fontRef idx="minor"/>
-      </dsp:style>
-    </dsp:sp>
-    <dsp:sp modelId="{BFFDE244-4A16-46EC-B371-1FCE835E28A3}">
-      <dsp:nvSpPr>
-        <dsp:cNvPr id="0" name=""/>
-        <dsp:cNvSpPr/>
-      </dsp:nvSpPr>
-      <dsp:spPr>
-        <a:xfrm>
-          <a:off x="6237103" y="1737448"/>
-          <a:ext cx="120462" cy="865114"/>
-        </a:xfrm>
-        <a:custGeom>
-          <a:avLst/>
-          <a:gdLst/>
-          <a:ahLst/>
-          <a:cxnLst/>
-          <a:rect l="0" t="0" r="0" b="0"/>
-          <a:pathLst>
-            <a:path>
-              <a:moveTo>
-                <a:pt x="0" y="0"/>
-              </a:moveTo>
-              <a:lnTo>
-                <a:pt x="0" y="865114"/>
-              </a:lnTo>
-              <a:lnTo>
-                <a:pt x="120462" y="865114"/>
+                <a:pt x="134235" y="964029"/>
               </a:lnTo>
             </a:path>
           </a:pathLst>
@@ -3981,8 +3755,8 @@
       </dsp:nvSpPr>
       <dsp:spPr>
         <a:xfrm>
-          <a:off x="6237103" y="1737448"/>
-          <a:ext cx="120462" cy="343002"/>
+          <a:off x="5954445" y="1637594"/>
+          <a:ext cx="134235" cy="382220"/>
         </a:xfrm>
         <a:custGeom>
           <a:avLst/>
@@ -3996,10 +3770,10 @@
                 <a:pt x="0" y="0"/>
               </a:moveTo>
               <a:lnTo>
-                <a:pt x="0" y="343002"/>
+                <a:pt x="0" y="382220"/>
               </a:lnTo>
               <a:lnTo>
-                <a:pt x="120462" y="343002"/>
+                <a:pt x="134235" y="382220"/>
               </a:lnTo>
             </a:path>
           </a:pathLst>
@@ -4040,8 +3814,8 @@
       </dsp:nvSpPr>
       <dsp:spPr>
         <a:xfrm>
-          <a:off x="4326934" y="924103"/>
-          <a:ext cx="2231402" cy="455374"/>
+          <a:off x="4321639" y="731253"/>
+          <a:ext cx="1990768" cy="507440"/>
         </a:xfrm>
         <a:custGeom>
           <a:avLst/>
@@ -4055,13 +3829,13 @@
                 <a:pt x="0" y="0"/>
               </a:moveTo>
               <a:lnTo>
-                <a:pt x="0" y="378160"/>
+                <a:pt x="0" y="421398"/>
               </a:lnTo>
               <a:lnTo>
-                <a:pt x="2231402" y="378160"/>
+                <a:pt x="1990768" y="421398"/>
               </a:lnTo>
               <a:lnTo>
-                <a:pt x="2231402" y="455374"/>
+                <a:pt x="1990768" y="507440"/>
               </a:lnTo>
             </a:path>
           </a:pathLst>
@@ -4102,8 +3876,8 @@
       </dsp:nvSpPr>
       <dsp:spPr>
         <a:xfrm>
-          <a:off x="4326934" y="924103"/>
-          <a:ext cx="1307748" cy="455374"/>
+          <a:off x="4321639" y="731253"/>
+          <a:ext cx="961505" cy="507440"/>
         </a:xfrm>
         <a:custGeom>
           <a:avLst/>
@@ -4117,13 +3891,13 @@
                 <a:pt x="0" y="0"/>
               </a:moveTo>
               <a:lnTo>
-                <a:pt x="0" y="378160"/>
+                <a:pt x="0" y="421398"/>
               </a:lnTo>
               <a:lnTo>
-                <a:pt x="1307748" y="378160"/>
+                <a:pt x="961505" y="421398"/>
               </a:lnTo>
               <a:lnTo>
-                <a:pt x="1307748" y="455374"/>
+                <a:pt x="961505" y="507440"/>
               </a:lnTo>
             </a:path>
           </a:pathLst>
@@ -4164,8 +3938,8 @@
       </dsp:nvSpPr>
       <dsp:spPr>
         <a:xfrm>
-          <a:off x="4326934" y="924103"/>
-          <a:ext cx="398132" cy="455374"/>
+          <a:off x="4223806" y="731253"/>
+          <a:ext cx="91440" cy="507440"/>
         </a:xfrm>
         <a:custGeom>
           <a:avLst/>
@@ -4176,16 +3950,16 @@
           <a:pathLst>
             <a:path>
               <a:moveTo>
-                <a:pt x="0" y="0"/>
+                <a:pt x="97832" y="0"/>
               </a:moveTo>
               <a:lnTo>
-                <a:pt x="0" y="378160"/>
+                <a:pt x="97832" y="421398"/>
               </a:lnTo>
               <a:lnTo>
-                <a:pt x="398132" y="378160"/>
+                <a:pt x="45720" y="421398"/>
               </a:lnTo>
               <a:lnTo>
-                <a:pt x="398132" y="455374"/>
+                <a:pt x="45720" y="507440"/>
               </a:lnTo>
             </a:path>
           </a:pathLst>
@@ -4226,8 +4000,8 @@
       </dsp:nvSpPr>
       <dsp:spPr>
         <a:xfrm>
-          <a:off x="3855088" y="924103"/>
-          <a:ext cx="471846" cy="455374"/>
+          <a:off x="3300075" y="731253"/>
+          <a:ext cx="1021563" cy="507440"/>
         </a:xfrm>
         <a:custGeom>
           <a:avLst/>
@@ -4238,78 +4012,16 @@
           <a:pathLst>
             <a:path>
               <a:moveTo>
-                <a:pt x="471846" y="0"/>
+                <a:pt x="1021563" y="0"/>
               </a:moveTo>
               <a:lnTo>
-                <a:pt x="471846" y="378160"/>
+                <a:pt x="1021563" y="421398"/>
               </a:lnTo>
               <a:lnTo>
-                <a:pt x="0" y="378160"/>
+                <a:pt x="0" y="421398"/>
               </a:lnTo>
               <a:lnTo>
-                <a:pt x="0" y="455374"/>
-              </a:lnTo>
-            </a:path>
-          </a:pathLst>
-        </a:custGeom>
-        <a:noFill/>
-        <a:ln w="12700" cap="flat" cmpd="sng" algn="ctr">
-          <a:solidFill>
-            <a:schemeClr val="dk2">
-              <a:shade val="60000"/>
-              <a:hueOff val="0"/>
-              <a:satOff val="0"/>
-              <a:lumOff val="0"/>
-              <a:alphaOff val="0"/>
-            </a:schemeClr>
-          </a:solidFill>
-          <a:prstDash val="solid"/>
-          <a:miter lim="800000"/>
-        </a:ln>
-        <a:effectLst/>
-      </dsp:spPr>
-      <dsp:style>
-        <a:lnRef idx="2">
-          <a:scrgbClr r="0" g="0" b="0"/>
-        </a:lnRef>
-        <a:fillRef idx="0">
-          <a:scrgbClr r="0" g="0" b="0"/>
-        </a:fillRef>
-        <a:effectRef idx="0">
-          <a:scrgbClr r="0" g="0" b="0"/>
-        </a:effectRef>
-        <a:fontRef idx="minor"/>
-      </dsp:style>
-    </dsp:sp>
-    <dsp:sp modelId="{ADFD04E9-E27B-43C8-B910-7FB1EC572950}">
-      <dsp:nvSpPr>
-        <dsp:cNvPr id="0" name=""/>
-        <dsp:cNvSpPr/>
-      </dsp:nvSpPr>
-      <dsp:spPr>
-        <a:xfrm>
-          <a:off x="2965290" y="924103"/>
-          <a:ext cx="1361643" cy="455374"/>
-        </a:xfrm>
-        <a:custGeom>
-          <a:avLst/>
-          <a:gdLst/>
-          <a:ahLst/>
-          <a:cxnLst/>
-          <a:rect l="0" t="0" r="0" b="0"/>
-          <a:pathLst>
-            <a:path>
-              <a:moveTo>
-                <a:pt x="1361643" y="0"/>
-              </a:moveTo>
-              <a:lnTo>
-                <a:pt x="1361643" y="378160"/>
-              </a:lnTo>
-              <a:lnTo>
-                <a:pt x="0" y="378160"/>
-              </a:lnTo>
-              <a:lnTo>
-                <a:pt x="0" y="455374"/>
+                <a:pt x="0" y="507440"/>
               </a:lnTo>
             </a:path>
           </a:pathLst>
@@ -4350,8 +4062,8 @@
       </dsp:nvSpPr>
       <dsp:spPr>
         <a:xfrm>
-          <a:off x="1427747" y="1747162"/>
-          <a:ext cx="169238" cy="2431452"/>
+          <a:off x="1586733" y="1648419"/>
+          <a:ext cx="188588" cy="2709458"/>
         </a:xfrm>
         <a:custGeom>
           <a:avLst/>
@@ -4365,10 +4077,10 @@
                 <a:pt x="0" y="0"/>
               </a:moveTo>
               <a:lnTo>
-                <a:pt x="0" y="2431452"/>
+                <a:pt x="0" y="2709458"/>
               </a:lnTo>
               <a:lnTo>
-                <a:pt x="169238" y="2431452"/>
+                <a:pt x="188588" y="2709458"/>
               </a:lnTo>
             </a:path>
           </a:pathLst>
@@ -4409,8 +4121,8 @@
       </dsp:nvSpPr>
       <dsp:spPr>
         <a:xfrm>
-          <a:off x="1427747" y="1747162"/>
-          <a:ext cx="169238" cy="1909339"/>
+          <a:off x="1586733" y="1648419"/>
+          <a:ext cx="188588" cy="2127649"/>
         </a:xfrm>
         <a:custGeom>
           <a:avLst/>
@@ -4424,10 +4136,10 @@
                 <a:pt x="0" y="0"/>
               </a:moveTo>
               <a:lnTo>
-                <a:pt x="0" y="1909339"/>
+                <a:pt x="0" y="2127649"/>
               </a:lnTo>
               <a:lnTo>
-                <a:pt x="169238" y="1909339"/>
+                <a:pt x="188588" y="2127649"/>
               </a:lnTo>
             </a:path>
           </a:pathLst>
@@ -4468,8 +4180,8 @@
       </dsp:nvSpPr>
       <dsp:spPr>
         <a:xfrm>
-          <a:off x="1427747" y="1747162"/>
-          <a:ext cx="148670" cy="1387227"/>
+          <a:off x="1586733" y="1648419"/>
+          <a:ext cx="165668" cy="1545839"/>
         </a:xfrm>
         <a:custGeom>
           <a:avLst/>
@@ -4483,10 +4195,10 @@
                 <a:pt x="0" y="0"/>
               </a:moveTo>
               <a:lnTo>
-                <a:pt x="0" y="1387227"/>
+                <a:pt x="0" y="1545839"/>
               </a:lnTo>
               <a:lnTo>
-                <a:pt x="148670" y="1387227"/>
+                <a:pt x="165668" y="1545839"/>
               </a:lnTo>
             </a:path>
           </a:pathLst>
@@ -4527,8 +4239,8 @@
       </dsp:nvSpPr>
       <dsp:spPr>
         <a:xfrm>
-          <a:off x="1427747" y="1747162"/>
-          <a:ext cx="155714" cy="894055"/>
+          <a:off x="1586733" y="1648419"/>
+          <a:ext cx="173518" cy="996279"/>
         </a:xfrm>
         <a:custGeom>
           <a:avLst/>
@@ -4542,10 +4254,10 @@
                 <a:pt x="0" y="0"/>
               </a:moveTo>
               <a:lnTo>
-                <a:pt x="0" y="894055"/>
+                <a:pt x="0" y="996279"/>
               </a:lnTo>
               <a:lnTo>
-                <a:pt x="155714" y="894055"/>
+                <a:pt x="173518" y="996279"/>
               </a:lnTo>
             </a:path>
           </a:pathLst>
@@ -4586,8 +4298,8 @@
       </dsp:nvSpPr>
       <dsp:spPr>
         <a:xfrm>
-          <a:off x="1427747" y="1747162"/>
-          <a:ext cx="148670" cy="343002"/>
+          <a:off x="1586733" y="1648419"/>
+          <a:ext cx="165668" cy="382220"/>
         </a:xfrm>
         <a:custGeom>
           <a:avLst/>
@@ -4601,10 +4313,10 @@
                 <a:pt x="0" y="0"/>
               </a:moveTo>
               <a:lnTo>
-                <a:pt x="0" y="343002"/>
+                <a:pt x="0" y="382220"/>
               </a:lnTo>
               <a:lnTo>
-                <a:pt x="148670" y="343002"/>
+                <a:pt x="165668" y="382220"/>
               </a:lnTo>
             </a:path>
           </a:pathLst>
@@ -4645,8 +4357,8 @@
       </dsp:nvSpPr>
       <dsp:spPr>
         <a:xfrm>
-          <a:off x="1879050" y="924103"/>
-          <a:ext cx="2447884" cy="455374"/>
+          <a:off x="2089637" y="731253"/>
+          <a:ext cx="2232001" cy="507440"/>
         </a:xfrm>
         <a:custGeom>
           <a:avLst/>
@@ -4657,16 +4369,16 @@
           <a:pathLst>
             <a:path>
               <a:moveTo>
-                <a:pt x="2447884" y="0"/>
+                <a:pt x="2232001" y="0"/>
               </a:moveTo>
               <a:lnTo>
-                <a:pt x="2447884" y="378160"/>
+                <a:pt x="2232001" y="421398"/>
               </a:lnTo>
               <a:lnTo>
-                <a:pt x="0" y="378160"/>
+                <a:pt x="0" y="421398"/>
               </a:lnTo>
               <a:lnTo>
-                <a:pt x="0" y="455374"/>
+                <a:pt x="0" y="507440"/>
               </a:lnTo>
             </a:path>
           </a:pathLst>
@@ -4707,8 +4419,8 @@
       </dsp:nvSpPr>
       <dsp:spPr>
         <a:xfrm>
-          <a:off x="132327" y="1747162"/>
-          <a:ext cx="142495" cy="1387227"/>
+          <a:off x="143197" y="1648419"/>
+          <a:ext cx="158788" cy="1545839"/>
         </a:xfrm>
         <a:custGeom>
           <a:avLst/>
@@ -4722,10 +4434,10 @@
                 <a:pt x="0" y="0"/>
               </a:moveTo>
               <a:lnTo>
-                <a:pt x="0" y="1387227"/>
+                <a:pt x="0" y="1545839"/>
               </a:lnTo>
               <a:lnTo>
-                <a:pt x="142495" y="1387227"/>
+                <a:pt x="158788" y="1545839"/>
               </a:lnTo>
             </a:path>
           </a:pathLst>
@@ -4766,8 +4478,8 @@
       </dsp:nvSpPr>
       <dsp:spPr>
         <a:xfrm>
-          <a:off x="132327" y="1747162"/>
-          <a:ext cx="142495" cy="869846"/>
+          <a:off x="143197" y="1648419"/>
+          <a:ext cx="158788" cy="969303"/>
         </a:xfrm>
         <a:custGeom>
           <a:avLst/>
@@ -4781,10 +4493,10 @@
                 <a:pt x="0" y="0"/>
               </a:moveTo>
               <a:lnTo>
-                <a:pt x="0" y="869846"/>
+                <a:pt x="0" y="969303"/>
               </a:lnTo>
               <a:lnTo>
-                <a:pt x="142495" y="869846"/>
+                <a:pt x="158788" y="969303"/>
               </a:lnTo>
             </a:path>
           </a:pathLst>
@@ -4825,8 +4537,8 @@
       </dsp:nvSpPr>
       <dsp:spPr>
         <a:xfrm>
-          <a:off x="132327" y="1747162"/>
-          <a:ext cx="142495" cy="347734"/>
+          <a:off x="143197" y="1648419"/>
+          <a:ext cx="158788" cy="387493"/>
         </a:xfrm>
         <a:custGeom>
           <a:avLst/>
@@ -4840,10 +4552,10 @@
                 <a:pt x="0" y="0"/>
               </a:moveTo>
               <a:lnTo>
-                <a:pt x="0" y="347734"/>
+                <a:pt x="0" y="387493"/>
               </a:lnTo>
               <a:lnTo>
-                <a:pt x="142495" y="347734"/>
+                <a:pt x="158788" y="387493"/>
               </a:lnTo>
             </a:path>
           </a:pathLst>
@@ -4884,8 +4596,8 @@
       </dsp:nvSpPr>
       <dsp:spPr>
         <a:xfrm>
-          <a:off x="593715" y="924103"/>
-          <a:ext cx="3733218" cy="455374"/>
+          <a:off x="657340" y="731253"/>
+          <a:ext cx="3664298" cy="507440"/>
         </a:xfrm>
         <a:custGeom>
           <a:avLst/>
@@ -4896,16 +4608,16 @@
           <a:pathLst>
             <a:path>
               <a:moveTo>
-                <a:pt x="3733218" y="0"/>
+                <a:pt x="3664298" y="0"/>
               </a:moveTo>
               <a:lnTo>
-                <a:pt x="3733218" y="378160"/>
+                <a:pt x="3664298" y="421398"/>
               </a:lnTo>
               <a:lnTo>
-                <a:pt x="0" y="378160"/>
+                <a:pt x="0" y="421398"/>
               </a:lnTo>
               <a:lnTo>
-                <a:pt x="0" y="455374"/>
+                <a:pt x="0" y="507440"/>
               </a:lnTo>
             </a:path>
           </a:pathLst>
@@ -4946,8 +4658,8 @@
       </dsp:nvSpPr>
       <dsp:spPr>
         <a:xfrm>
-          <a:off x="3487660" y="562883"/>
-          <a:ext cx="1678547" cy="361220"/>
+          <a:off x="3386404" y="328731"/>
+          <a:ext cx="1870468" cy="402522"/>
         </a:xfrm>
         <a:prstGeom prst="rect">
           <a:avLst/>
@@ -5033,8 +4745,8 @@
         </a:p>
       </dsp:txBody>
       <dsp:txXfrm>
-        <a:off x="3487660" y="562883"/>
-        <a:ext cx="1678547" cy="361220"/>
+        <a:off x="3386404" y="328731"/>
+        <a:ext cx="1870468" cy="402522"/>
       </dsp:txXfrm>
     </dsp:sp>
     <dsp:sp modelId="{035F586F-77DB-4363-B3F5-5DA36B444564}">
@@ -5044,8 +4756,8 @@
       </dsp:nvSpPr>
       <dsp:spPr>
         <a:xfrm>
-          <a:off x="16980" y="1379478"/>
-          <a:ext cx="1153471" cy="367684"/>
+          <a:off x="14662" y="1238694"/>
+          <a:ext cx="1285356" cy="409725"/>
         </a:xfrm>
         <a:prstGeom prst="roundRect">
           <a:avLst/>
@@ -5147,8 +4859,8 @@
         </a:p>
       </dsp:txBody>
       <dsp:txXfrm>
-        <a:off x="34929" y="1397427"/>
-        <a:ext cx="1117573" cy="331786"/>
+        <a:off x="34663" y="1258695"/>
+        <a:ext cx="1245354" cy="369723"/>
       </dsp:txXfrm>
     </dsp:sp>
     <dsp:sp modelId="{4AE6D973-2408-4A99-8977-97432C80BC26}">
@@ -5158,8 +4870,8 @@
       </dsp:nvSpPr>
       <dsp:spPr>
         <a:xfrm>
-          <a:off x="274822" y="1911054"/>
-          <a:ext cx="735369" cy="367684"/>
+          <a:off x="301986" y="1831050"/>
+          <a:ext cx="819450" cy="409725"/>
         </a:xfrm>
         <a:prstGeom prst="rect">
           <a:avLst/>
@@ -5262,8 +4974,8 @@
         </a:p>
       </dsp:txBody>
       <dsp:txXfrm>
-        <a:off x="274822" y="1911054"/>
-        <a:ext cx="735369" cy="367684"/>
+        <a:off x="301986" y="1831050"/>
+        <a:ext cx="819450" cy="409725"/>
       </dsp:txXfrm>
     </dsp:sp>
     <dsp:sp modelId="{29FBCDE1-AB17-4BD8-BDA9-BED1B69B4924}">
@@ -5273,8 +4985,8 @@
       </dsp:nvSpPr>
       <dsp:spPr>
         <a:xfrm>
-          <a:off x="274822" y="2433167"/>
-          <a:ext cx="735369" cy="367684"/>
+          <a:off x="301986" y="2412859"/>
+          <a:ext cx="819450" cy="409725"/>
         </a:xfrm>
         <a:prstGeom prst="rect">
           <a:avLst/>
@@ -5377,8 +5089,8 @@
         </a:p>
       </dsp:txBody>
       <dsp:txXfrm>
-        <a:off x="274822" y="2433167"/>
-        <a:ext cx="735369" cy="367684"/>
+        <a:off x="301986" y="2412859"/>
+        <a:ext cx="819450" cy="409725"/>
       </dsp:txXfrm>
     </dsp:sp>
     <dsp:sp modelId="{17DBEF4E-9197-4AFC-8B80-47C4CA356FD3}">
@@ -5388,8 +5100,8 @@
       </dsp:nvSpPr>
       <dsp:spPr>
         <a:xfrm>
-          <a:off x="274822" y="2950547"/>
-          <a:ext cx="735369" cy="367684"/>
+          <a:off x="301986" y="2989396"/>
+          <a:ext cx="819450" cy="409725"/>
         </a:xfrm>
         <a:prstGeom prst="rect">
           <a:avLst/>
@@ -5492,8 +5204,8 @@
         </a:p>
       </dsp:txBody>
       <dsp:txXfrm>
-        <a:off x="274822" y="2950547"/>
-        <a:ext cx="735369" cy="367684"/>
+        <a:off x="301986" y="2989396"/>
+        <a:ext cx="819450" cy="409725"/>
       </dsp:txXfrm>
     </dsp:sp>
     <dsp:sp modelId="{56F768EC-FEA2-49DF-A1F5-6EAB512383A2}">
@@ -5503,8 +5215,8 @@
       </dsp:nvSpPr>
       <dsp:spPr>
         <a:xfrm>
-          <a:off x="1314922" y="1379478"/>
-          <a:ext cx="1128255" cy="367684"/>
+          <a:off x="1461008" y="1238694"/>
+          <a:ext cx="1257257" cy="409725"/>
         </a:xfrm>
         <a:prstGeom prst="rect">
           <a:avLst/>
@@ -5606,8 +5318,8 @@
         </a:p>
       </dsp:txBody>
       <dsp:txXfrm>
-        <a:off x="1314922" y="1379478"/>
-        <a:ext cx="1128255" cy="367684"/>
+        <a:off x="1461008" y="1238694"/>
+        <a:ext cx="1257257" cy="409725"/>
       </dsp:txXfrm>
     </dsp:sp>
     <dsp:sp modelId="{EB179761-8B3B-4EB9-9EA1-D84BC7D38023}">
@@ -5617,8 +5329,8 @@
       </dsp:nvSpPr>
       <dsp:spPr>
         <a:xfrm>
-          <a:off x="1576418" y="1906322"/>
-          <a:ext cx="735369" cy="367684"/>
+          <a:off x="1752402" y="1825777"/>
+          <a:ext cx="819450" cy="409725"/>
         </a:xfrm>
         <a:prstGeom prst="rect">
           <a:avLst/>
@@ -5721,8 +5433,8 @@
         </a:p>
       </dsp:txBody>
       <dsp:txXfrm>
-        <a:off x="1576418" y="1906322"/>
-        <a:ext cx="735369" cy="367684"/>
+        <a:off x="1752402" y="1825777"/>
+        <a:ext cx="819450" cy="409725"/>
       </dsp:txXfrm>
     </dsp:sp>
     <dsp:sp modelId="{B3039094-0E85-440F-8060-B13F2AFB1B44}">
@@ -5732,8 +5444,8 @@
       </dsp:nvSpPr>
       <dsp:spPr>
         <a:xfrm>
-          <a:off x="1583462" y="2457375"/>
-          <a:ext cx="735369" cy="367684"/>
+          <a:off x="1760252" y="2439836"/>
+          <a:ext cx="819450" cy="409725"/>
         </a:xfrm>
         <a:prstGeom prst="rect">
           <a:avLst/>
@@ -5836,8 +5548,8 @@
         </a:p>
       </dsp:txBody>
       <dsp:txXfrm>
-        <a:off x="1583462" y="2457375"/>
-        <a:ext cx="735369" cy="367684"/>
+        <a:off x="1760252" y="2439836"/>
+        <a:ext cx="819450" cy="409725"/>
       </dsp:txXfrm>
     </dsp:sp>
     <dsp:sp modelId="{EA31EAA2-8FD1-48BE-AD0D-DD4F42FDC50A}">
@@ -5847,8 +5559,8 @@
       </dsp:nvSpPr>
       <dsp:spPr>
         <a:xfrm>
-          <a:off x="1576418" y="2950547"/>
-          <a:ext cx="735369" cy="367684"/>
+          <a:off x="1752402" y="2989396"/>
+          <a:ext cx="819450" cy="409725"/>
         </a:xfrm>
         <a:prstGeom prst="rect">
           <a:avLst/>
@@ -5951,8 +5663,8 @@
         </a:p>
       </dsp:txBody>
       <dsp:txXfrm>
-        <a:off x="1576418" y="2950547"/>
-        <a:ext cx="735369" cy="367684"/>
+        <a:off x="1752402" y="2989396"/>
+        <a:ext cx="819450" cy="409725"/>
       </dsp:txXfrm>
     </dsp:sp>
     <dsp:sp modelId="{ADCD2133-654C-430B-93BA-F3A8CCB4ACEF}">
@@ -5962,8 +5674,8 @@
       </dsp:nvSpPr>
       <dsp:spPr>
         <a:xfrm>
-          <a:off x="1596986" y="3472660"/>
-          <a:ext cx="735369" cy="367684"/>
+          <a:off x="1775322" y="3571205"/>
+          <a:ext cx="819450" cy="409725"/>
         </a:xfrm>
         <a:prstGeom prst="rect">
           <a:avLst/>
@@ -6066,8 +5778,8 @@
         </a:p>
       </dsp:txBody>
       <dsp:txXfrm>
-        <a:off x="1596986" y="3472660"/>
-        <a:ext cx="735369" cy="367684"/>
+        <a:off x="1775322" y="3571205"/>
+        <a:ext cx="819450" cy="409725"/>
       </dsp:txXfrm>
     </dsp:sp>
     <dsp:sp modelId="{2CFF089F-5388-4C22-B30C-4ABD6B9349AD}">
@@ -6077,8 +5789,8 @@
       </dsp:nvSpPr>
       <dsp:spPr>
         <a:xfrm>
-          <a:off x="1596986" y="3994772"/>
-          <a:ext cx="735369" cy="367684"/>
+          <a:off x="1775322" y="4153015"/>
+          <a:ext cx="819450" cy="409725"/>
         </a:xfrm>
         <a:prstGeom prst="rect">
           <a:avLst/>
@@ -6181,146 +5893,8 @@
         </a:p>
       </dsp:txBody>
       <dsp:txXfrm>
-        <a:off x="1596986" y="3994772"/>
-        <a:ext cx="735369" cy="367684"/>
-      </dsp:txXfrm>
-    </dsp:sp>
-    <dsp:sp modelId="{8BA562D8-DC7C-424D-9797-DD3F3C147DA2}">
-      <dsp:nvSpPr>
-        <dsp:cNvPr id="0" name=""/>
-        <dsp:cNvSpPr/>
-      </dsp:nvSpPr>
-      <dsp:spPr>
-        <a:xfrm>
-          <a:off x="2597605" y="1379478"/>
-          <a:ext cx="735369" cy="367684"/>
-        </a:xfrm>
-        <a:prstGeom prst="rect">
-          <a:avLst/>
-        </a:prstGeom>
-        <a:gradFill rotWithShape="0">
-          <a:gsLst>
-            <a:gs pos="25000">
-              <a:prstClr val="white">
-                <a:hueOff val="0"/>
-                <a:satOff val="0"/>
-                <a:lumOff val="0"/>
-                <a:alphaOff val="0"/>
-                <a:tint val="65000"/>
-                <a:shade val="92000"/>
-                <a:satMod val="130000"/>
-              </a:prstClr>
-            </a:gs>
-            <a:gs pos="45000">
-              <a:prstClr val="white">
-                <a:hueOff val="0"/>
-                <a:satOff val="0"/>
-                <a:lumOff val="0"/>
-                <a:alphaOff val="0"/>
-                <a:tint val="60000"/>
-                <a:shade val="99000"/>
-                <a:satMod val="120000"/>
-              </a:prstClr>
-            </a:gs>
-            <a:gs pos="100000">
-              <a:prstClr val="white">
-                <a:hueOff val="0"/>
-                <a:satOff val="0"/>
-                <a:lumOff val="0"/>
-                <a:alphaOff val="0"/>
-                <a:tint val="55000"/>
-                <a:satMod val="140000"/>
-              </a:prstClr>
-            </a:gs>
-          </a:gsLst>
-          <a:lin ang="5400000" scaled="0"/>
-        </a:gradFill>
-        <a:ln>
-          <a:solidFill>
-            <a:srgbClr val="1F497D"/>
-          </a:solidFill>
-        </a:ln>
-        <a:effectLst>
-          <a:outerShdw blurRad="50800" dist="38100" dir="5400000" algn="t" rotWithShape="0">
-            <a:prstClr val="black">
-              <a:alpha val="40000"/>
-            </a:prstClr>
-          </a:outerShdw>
-        </a:effectLst>
-        <a:scene3d>
-          <a:camera prst="orthographicFront"/>
-          <a:lightRig rig="flat" dir="t"/>
-        </a:scene3d>
-        <a:sp3d prstMaterial="dkEdge">
-          <a:bevelT w="8200" h="38100"/>
-        </a:sp3d>
-      </dsp:spPr>
-      <dsp:style>
-        <a:lnRef idx="0">
-          <a:scrgbClr r="0" g="0" b="0"/>
-        </a:lnRef>
-        <a:fillRef idx="2">
-          <a:scrgbClr r="0" g="0" b="0"/>
-        </a:fillRef>
-        <a:effectRef idx="1">
-          <a:scrgbClr r="0" g="0" b="0"/>
-        </a:effectRef>
-        <a:fontRef idx="minor">
-          <a:schemeClr val="dk1"/>
-        </a:fontRef>
-      </dsp:style>
-      <dsp:txBody>
-        <a:bodyPr spcFirstLastPara="0" vert="horz" wrap="square" lIns="8890" tIns="8890" rIns="8890" bIns="8890" numCol="1" spcCol="1270" anchor="ctr" anchorCtr="0">
-          <a:noAutofit/>
-        </a:bodyPr>
-        <a:lstStyle/>
-        <a:p>
-          <a:pPr marL="0" lvl="0" indent="0" algn="ctr" defTabSz="622300">
-            <a:lnSpc>
-              <a:spcPct val="90000"/>
-            </a:lnSpc>
-            <a:spcBef>
-              <a:spcPct val="0"/>
-            </a:spcBef>
-            <a:spcAft>
-              <a:spcPct val="35000"/>
-            </a:spcAft>
-            <a:buNone/>
-          </a:pPr>
-          <a:r>
-            <a:rPr lang="en-US" sz="1400" b="0" kern="1200" dirty="0">
-              <a:solidFill>
-                <a:srgbClr val="44546A">
-                  <a:hueOff val="0"/>
-                  <a:satOff val="0"/>
-                  <a:lumOff val="0"/>
-                  <a:alphaOff val="0"/>
-                </a:srgbClr>
-              </a:solidFill>
-              <a:latin typeface="Calibri" panose="020F0502020204030204"/>
-              <a:ea typeface="+mn-ea"/>
-              <a:cs typeface="+mn-cs"/>
-            </a:rPr>
-            <a:t>All Recipes</a:t>
-          </a:r>
-          <a:endParaRPr lang="en-PH" sz="1400" b="0" kern="1200" dirty="0">
-            <a:solidFill>
-              <a:srgbClr val="44546A">
-                <a:hueOff val="0"/>
-                <a:satOff val="0"/>
-                <a:lumOff val="0"/>
-                <a:alphaOff val="0"/>
-              </a:srgbClr>
-            </a:solidFill>
-            <a:latin typeface="Calibri" panose="020F0502020204030204"/>
-            <a:ea typeface="+mn-ea"/>
-            <a:cs typeface="+mn-cs"/>
-          </a:endParaRPr>
-        </a:p>
-      </dsp:txBody>
-      <dsp:txXfrm>
-        <a:off x="2597605" y="1379478"/>
-        <a:ext cx="735369" cy="367684"/>
+        <a:off x="1775322" y="4153015"/>
+        <a:ext cx="819450" cy="409725"/>
       </dsp:txXfrm>
     </dsp:sp>
     <dsp:sp modelId="{DB382909-05C0-478F-8EDC-74E6252E2D80}">
@@ -6330,8 +5904,8 @@
       </dsp:nvSpPr>
       <dsp:spPr>
         <a:xfrm>
-          <a:off x="3487403" y="1379478"/>
-          <a:ext cx="735369" cy="367684"/>
+          <a:off x="2890350" y="1238694"/>
+          <a:ext cx="819450" cy="409725"/>
         </a:xfrm>
         <a:prstGeom prst="rect">
           <a:avLst/>
@@ -6457,8 +6031,8 @@
         </a:p>
       </dsp:txBody>
       <dsp:txXfrm>
-        <a:off x="3487403" y="1379478"/>
-        <a:ext cx="735369" cy="367684"/>
+        <a:off x="2890350" y="1238694"/>
+        <a:ext cx="819450" cy="409725"/>
       </dsp:txXfrm>
     </dsp:sp>
     <dsp:sp modelId="{5746B83C-5D69-42C5-8889-FAE289074D20}">
@@ -6468,8 +6042,8 @@
       </dsp:nvSpPr>
       <dsp:spPr>
         <a:xfrm>
-          <a:off x="4357382" y="1379478"/>
-          <a:ext cx="735369" cy="367684"/>
+          <a:off x="3859801" y="1238694"/>
+          <a:ext cx="819450" cy="409725"/>
         </a:xfrm>
         <a:prstGeom prst="rect">
           <a:avLst/>
@@ -6595,8 +6169,8 @@
         </a:p>
       </dsp:txBody>
       <dsp:txXfrm>
-        <a:off x="4357382" y="1379478"/>
-        <a:ext cx="735369" cy="367684"/>
+        <a:off x="3859801" y="1238694"/>
+        <a:ext cx="819450" cy="409725"/>
       </dsp:txXfrm>
     </dsp:sp>
     <dsp:sp modelId="{E911C1DE-D631-47A5-AD0B-1CBECFF8B70C}">
@@ -6606,8 +6180,8 @@
       </dsp:nvSpPr>
       <dsp:spPr>
         <a:xfrm>
-          <a:off x="5266998" y="1379478"/>
-          <a:ext cx="735369" cy="367684"/>
+          <a:off x="4873419" y="1238694"/>
+          <a:ext cx="819450" cy="409725"/>
         </a:xfrm>
         <a:prstGeom prst="rect">
           <a:avLst/>
@@ -6733,8 +6307,8 @@
         </a:p>
       </dsp:txBody>
       <dsp:txXfrm>
-        <a:off x="5266998" y="1379478"/>
-        <a:ext cx="735369" cy="367684"/>
+        <a:off x="4873419" y="1238694"/>
+        <a:ext cx="819450" cy="409725"/>
       </dsp:txXfrm>
     </dsp:sp>
     <dsp:sp modelId="{6387E1E4-2E36-41AC-8665-DA093ADD23CD}">
@@ -6744,8 +6318,8 @@
       </dsp:nvSpPr>
       <dsp:spPr>
         <a:xfrm>
-          <a:off x="6156795" y="1379478"/>
-          <a:ext cx="803082" cy="357970"/>
+          <a:off x="5864954" y="1238694"/>
+          <a:ext cx="894905" cy="398900"/>
         </a:xfrm>
         <a:prstGeom prst="rect">
           <a:avLst/>
@@ -6871,8 +6445,8 @@
         </a:p>
       </dsp:txBody>
       <dsp:txXfrm>
-        <a:off x="6156795" y="1379478"/>
-        <a:ext cx="803082" cy="357970"/>
+        <a:off x="5864954" y="1238694"/>
+        <a:ext cx="894905" cy="398900"/>
       </dsp:txXfrm>
     </dsp:sp>
     <dsp:sp modelId="{A6D1BAD3-E13E-4527-81EC-D4617BB13AF8}">
@@ -6882,8 +6456,8 @@
       </dsp:nvSpPr>
       <dsp:spPr>
         <a:xfrm>
-          <a:off x="6357566" y="1896608"/>
-          <a:ext cx="735369" cy="367684"/>
+          <a:off x="6088680" y="1814952"/>
+          <a:ext cx="819450" cy="409725"/>
         </a:xfrm>
         <a:prstGeom prst="rect">
           <a:avLst/>
@@ -6980,14 +6554,14 @@
           </a:pPr>
           <a:r>
             <a:rPr lang="en-US" sz="1200" kern="1200" dirty="0"/>
-            <a:t>Meet Lucky</a:t>
+            <a:t>About</a:t>
           </a:r>
           <a:endParaRPr lang="en-PH" sz="1200" kern="1200" dirty="0"/>
         </a:p>
       </dsp:txBody>
       <dsp:txXfrm>
-        <a:off x="6357566" y="1896608"/>
-        <a:ext cx="735369" cy="367684"/>
+        <a:off x="6088680" y="1814952"/>
+        <a:ext cx="819450" cy="409725"/>
       </dsp:txXfrm>
     </dsp:sp>
     <dsp:sp modelId="{7DC92F64-5D8A-45B1-95FA-6B3E570AA4CB}">
@@ -6997,8 +6571,8 @@
       </dsp:nvSpPr>
       <dsp:spPr>
         <a:xfrm>
-          <a:off x="6357566" y="2418720"/>
-          <a:ext cx="735369" cy="367684"/>
+          <a:off x="6088680" y="2396761"/>
+          <a:ext cx="819450" cy="409725"/>
         </a:xfrm>
         <a:prstGeom prst="rect">
           <a:avLst/>
@@ -7101,123 +6675,8 @@
         </a:p>
       </dsp:txBody>
       <dsp:txXfrm>
-        <a:off x="6357566" y="2418720"/>
-        <a:ext cx="735369" cy="367684"/>
-      </dsp:txXfrm>
-    </dsp:sp>
-    <dsp:sp modelId="{9E7841B2-EBAD-4701-890D-0C1033E70FDA}">
-      <dsp:nvSpPr>
-        <dsp:cNvPr id="0" name=""/>
-        <dsp:cNvSpPr/>
-      </dsp:nvSpPr>
-      <dsp:spPr>
-        <a:xfrm>
-          <a:off x="6357566" y="2936101"/>
-          <a:ext cx="735369" cy="367684"/>
-        </a:xfrm>
-        <a:prstGeom prst="rect">
-          <a:avLst/>
-        </a:prstGeom>
-        <a:gradFill rotWithShape="0">
-          <a:gsLst>
-            <a:gs pos="0">
-              <a:schemeClr val="lt1">
-                <a:hueOff val="0"/>
-                <a:satOff val="0"/>
-                <a:lumOff val="0"/>
-                <a:alphaOff val="0"/>
-                <a:lumMod val="110000"/>
-                <a:satMod val="105000"/>
-                <a:tint val="67000"/>
-              </a:schemeClr>
-            </a:gs>
-            <a:gs pos="50000">
-              <a:schemeClr val="lt1">
-                <a:hueOff val="0"/>
-                <a:satOff val="0"/>
-                <a:lumOff val="0"/>
-                <a:alphaOff val="0"/>
-                <a:lumMod val="105000"/>
-                <a:satMod val="103000"/>
-                <a:tint val="73000"/>
-              </a:schemeClr>
-            </a:gs>
-            <a:gs pos="100000">
-              <a:schemeClr val="lt1">
-                <a:hueOff val="0"/>
-                <a:satOff val="0"/>
-                <a:lumOff val="0"/>
-                <a:alphaOff val="0"/>
-                <a:lumMod val="105000"/>
-                <a:satMod val="109000"/>
-                <a:tint val="81000"/>
-              </a:schemeClr>
-            </a:gs>
-          </a:gsLst>
-          <a:lin ang="5400000" scaled="0"/>
-        </a:gradFill>
-        <a:ln>
-          <a:solidFill>
-            <a:srgbClr val="1F497D"/>
-          </a:solidFill>
-        </a:ln>
-        <a:effectLst>
-          <a:outerShdw blurRad="50800" dist="38100" dir="10800000" algn="r" rotWithShape="0">
-            <a:prstClr val="black">
-              <a:alpha val="40000"/>
-            </a:prstClr>
-          </a:outerShdw>
-        </a:effectLst>
-        <a:scene3d>
-          <a:camera prst="orthographicFront"/>
-          <a:lightRig rig="flat" dir="t"/>
-        </a:scene3d>
-        <a:sp3d prstMaterial="dkEdge">
-          <a:bevelT w="8200" h="38100"/>
-        </a:sp3d>
-      </dsp:spPr>
-      <dsp:style>
-        <a:lnRef idx="0">
-          <a:scrgbClr r="0" g="0" b="0"/>
-        </a:lnRef>
-        <a:fillRef idx="2">
-          <a:scrgbClr r="0" g="0" b="0"/>
-        </a:fillRef>
-        <a:effectRef idx="1">
-          <a:scrgbClr r="0" g="0" b="0"/>
-        </a:effectRef>
-        <a:fontRef idx="minor">
-          <a:schemeClr val="dk1"/>
-        </a:fontRef>
-      </dsp:style>
-      <dsp:txBody>
-        <a:bodyPr spcFirstLastPara="0" vert="horz" wrap="square" lIns="7620" tIns="7620" rIns="7620" bIns="7620" numCol="1" spcCol="1270" anchor="ctr" anchorCtr="0">
-          <a:noAutofit/>
-        </a:bodyPr>
-        <a:lstStyle/>
-        <a:p>
-          <a:pPr marL="0" lvl="0" indent="0" algn="ctr" defTabSz="533400">
-            <a:lnSpc>
-              <a:spcPct val="90000"/>
-            </a:lnSpc>
-            <a:spcBef>
-              <a:spcPct val="0"/>
-            </a:spcBef>
-            <a:spcAft>
-              <a:spcPct val="35000"/>
-            </a:spcAft>
-            <a:buNone/>
-          </a:pPr>
-          <a:r>
-            <a:rPr lang="en-US" sz="1200" kern="1200" dirty="0"/>
-            <a:t>Privacy Disclosure</a:t>
-          </a:r>
-          <a:endParaRPr lang="en-PH" sz="1200" kern="1200" dirty="0"/>
-        </a:p>
-      </dsp:txBody>
-      <dsp:txXfrm>
-        <a:off x="6357566" y="2936101"/>
-        <a:ext cx="735369" cy="367684"/>
+        <a:off x="6088680" y="2396761"/>
+        <a:ext cx="819450" cy="409725"/>
       </dsp:txXfrm>
     </dsp:sp>
     <dsp:sp modelId="{48346BFF-0CEE-4005-8D91-4DCD324957F4}">
@@ -7227,8 +6686,8 @@
       </dsp:nvSpPr>
       <dsp:spPr>
         <a:xfrm>
-          <a:off x="7114305" y="1379478"/>
-          <a:ext cx="735369" cy="367684"/>
+          <a:off x="6931944" y="1238694"/>
+          <a:ext cx="819450" cy="409725"/>
         </a:xfrm>
         <a:prstGeom prst="rect">
           <a:avLst/>
@@ -7354,8 +6813,8 @@
         </a:p>
       </dsp:txBody>
       <dsp:txXfrm>
-        <a:off x="7114305" y="1379478"/>
-        <a:ext cx="735369" cy="367684"/>
+        <a:off x="6931944" y="1238694"/>
+        <a:ext cx="819450" cy="409725"/>
       </dsp:txXfrm>
     </dsp:sp>
     <dsp:sp modelId="{56A3BAB8-C607-4CB1-BF6B-DB77080C7495}">
@@ -7365,8 +6824,8 @@
       </dsp:nvSpPr>
       <dsp:spPr>
         <a:xfrm>
-          <a:off x="8004103" y="1379478"/>
-          <a:ext cx="735369" cy="367684"/>
+          <a:off x="7923478" y="1238694"/>
+          <a:ext cx="819450" cy="409725"/>
         </a:xfrm>
         <a:prstGeom prst="rect">
           <a:avLst/>
@@ -7468,8 +6927,8 @@
         </a:p>
       </dsp:txBody>
       <dsp:txXfrm>
-        <a:off x="8004103" y="1379478"/>
-        <a:ext cx="735369" cy="367684"/>
+        <a:off x="7923478" y="1238694"/>
+        <a:ext cx="819450" cy="409725"/>
       </dsp:txXfrm>
     </dsp:sp>
   </dsp:spTree>
@@ -9813,7 +9272,7 @@
           <a:p>
             <a:fld id="{A07889C2-2E96-4871-A131-CC55AD488614}" type="datetimeFigureOut">
               <a:rPr lang="en-PH" smtClean="0"/>
-              <a:t>11/06/2023</a:t>
+              <a:t>20/06/2023</a:t>
             </a:fld>
             <a:endParaRPr lang="en-PH"/>
           </a:p>
@@ -9983,7 +9442,7 @@
           <a:p>
             <a:fld id="{A07889C2-2E96-4871-A131-CC55AD488614}" type="datetimeFigureOut">
               <a:rPr lang="en-PH" smtClean="0"/>
-              <a:t>11/06/2023</a:t>
+              <a:t>20/06/2023</a:t>
             </a:fld>
             <a:endParaRPr lang="en-PH"/>
           </a:p>
@@ -10163,7 +9622,7 @@
           <a:p>
             <a:fld id="{A07889C2-2E96-4871-A131-CC55AD488614}" type="datetimeFigureOut">
               <a:rPr lang="en-PH" smtClean="0"/>
-              <a:t>11/06/2023</a:t>
+              <a:t>20/06/2023</a:t>
             </a:fld>
             <a:endParaRPr lang="en-PH"/>
           </a:p>
@@ -10333,7 +9792,7 @@
           <a:p>
             <a:fld id="{A07889C2-2E96-4871-A131-CC55AD488614}" type="datetimeFigureOut">
               <a:rPr lang="en-PH" smtClean="0"/>
-              <a:t>11/06/2023</a:t>
+              <a:t>20/06/2023</a:t>
             </a:fld>
             <a:endParaRPr lang="en-PH"/>
           </a:p>
@@ -10577,7 +10036,7 @@
           <a:p>
             <a:fld id="{A07889C2-2E96-4871-A131-CC55AD488614}" type="datetimeFigureOut">
               <a:rPr lang="en-PH" smtClean="0"/>
-              <a:t>11/06/2023</a:t>
+              <a:t>20/06/2023</a:t>
             </a:fld>
             <a:endParaRPr lang="en-PH"/>
           </a:p>
@@ -10809,7 +10268,7 @@
           <a:p>
             <a:fld id="{A07889C2-2E96-4871-A131-CC55AD488614}" type="datetimeFigureOut">
               <a:rPr lang="en-PH" smtClean="0"/>
-              <a:t>11/06/2023</a:t>
+              <a:t>20/06/2023</a:t>
             </a:fld>
             <a:endParaRPr lang="en-PH"/>
           </a:p>
@@ -11176,7 +10635,7 @@
           <a:p>
             <a:fld id="{A07889C2-2E96-4871-A131-CC55AD488614}" type="datetimeFigureOut">
               <a:rPr lang="en-PH" smtClean="0"/>
-              <a:t>11/06/2023</a:t>
+              <a:t>20/06/2023</a:t>
             </a:fld>
             <a:endParaRPr lang="en-PH"/>
           </a:p>
@@ -11294,7 +10753,7 @@
           <a:p>
             <a:fld id="{A07889C2-2E96-4871-A131-CC55AD488614}" type="datetimeFigureOut">
               <a:rPr lang="en-PH" smtClean="0"/>
-              <a:t>11/06/2023</a:t>
+              <a:t>20/06/2023</a:t>
             </a:fld>
             <a:endParaRPr lang="en-PH"/>
           </a:p>
@@ -11389,7 +10848,7 @@
           <a:p>
             <a:fld id="{A07889C2-2E96-4871-A131-CC55AD488614}" type="datetimeFigureOut">
               <a:rPr lang="en-PH" smtClean="0"/>
-              <a:t>11/06/2023</a:t>
+              <a:t>20/06/2023</a:t>
             </a:fld>
             <a:endParaRPr lang="en-PH"/>
           </a:p>
@@ -11666,7 +11125,7 @@
           <a:p>
             <a:fld id="{A07889C2-2E96-4871-A131-CC55AD488614}" type="datetimeFigureOut">
               <a:rPr lang="en-PH" smtClean="0"/>
-              <a:t>11/06/2023</a:t>
+              <a:t>20/06/2023</a:t>
             </a:fld>
             <a:endParaRPr lang="en-PH"/>
           </a:p>
@@ -11923,7 +11382,7 @@
           <a:p>
             <a:fld id="{A07889C2-2E96-4871-A131-CC55AD488614}" type="datetimeFigureOut">
               <a:rPr lang="en-PH" smtClean="0"/>
-              <a:t>11/06/2023</a:t>
+              <a:t>20/06/2023</a:t>
             </a:fld>
             <a:endParaRPr lang="en-PH"/>
           </a:p>
@@ -12136,7 +11595,7 @@
           <a:p>
             <a:fld id="{A07889C2-2E96-4871-A131-CC55AD488614}" type="datetimeFigureOut">
               <a:rPr lang="en-PH" smtClean="0"/>
-              <a:t>11/06/2023</a:t>
+              <a:t>20/06/2023</a:t>
             </a:fld>
             <a:endParaRPr lang="en-PH"/>
           </a:p>
@@ -13170,7 +12629,7 @@
         </p:nvSpPr>
         <p:spPr>
           <a:xfrm flipH="1">
-            <a:off x="2483442" y="439579"/>
+            <a:off x="2601447" y="438702"/>
             <a:ext cx="825670" cy="276999"/>
           </a:xfrm>
           <a:prstGeom prst="rect">
@@ -13188,7 +12647,7 @@
               <a:rPr lang="en-US" sz="1200" b="1" u="sng" dirty="0">
                 <a:latin typeface="Segoe UI Variable Small" pitchFamily="2" charset="0"/>
               </a:rPr>
-              <a:t>MENU</a:t>
+              <a:t>Menu</a:t>
             </a:r>
             <a:endParaRPr lang="en-PH" sz="1200" b="1" u="sng" dirty="0">
               <a:latin typeface="Segoe UI Variable Small" pitchFamily="2" charset="0"/>
@@ -13210,7 +12669,7 @@
         </p:nvSpPr>
         <p:spPr>
           <a:xfrm flipH="1">
-            <a:off x="3102232" y="422850"/>
+            <a:off x="3220237" y="421973"/>
             <a:ext cx="989776" cy="297454"/>
           </a:xfrm>
           <a:prstGeom prst="rect">
@@ -13246,7 +12705,7 @@
         </p:nvSpPr>
         <p:spPr>
           <a:xfrm flipH="1">
-            <a:off x="4103831" y="430009"/>
+            <a:off x="4221836" y="429132"/>
             <a:ext cx="1094431" cy="297454"/>
           </a:xfrm>
           <a:prstGeom prst="rect">
@@ -13320,7 +12779,7 @@
         </p:nvSpPr>
         <p:spPr>
           <a:xfrm flipH="1">
-            <a:off x="7528298" y="428275"/>
+            <a:off x="7595969" y="427398"/>
             <a:ext cx="620089" cy="297454"/>
           </a:xfrm>
           <a:prstGeom prst="rect">
@@ -13356,7 +12815,7 @@
         </p:nvSpPr>
         <p:spPr>
           <a:xfrm flipH="1">
-            <a:off x="6237429" y="430009"/>
+            <a:off x="6355434" y="429132"/>
             <a:ext cx="713367" cy="297454"/>
           </a:xfrm>
           <a:prstGeom prst="rect">
@@ -13392,7 +12851,7 @@
         </p:nvSpPr>
         <p:spPr>
           <a:xfrm flipH="1">
-            <a:off x="6847030" y="430009"/>
+            <a:off x="6965035" y="429132"/>
             <a:ext cx="713369" cy="297454"/>
           </a:xfrm>
           <a:prstGeom prst="rect">
@@ -13524,7 +12983,7 @@
         </p:nvSpPr>
         <p:spPr>
           <a:xfrm flipH="1">
-            <a:off x="5193799" y="430009"/>
+            <a:off x="5311804" y="429132"/>
             <a:ext cx="1094431" cy="297454"/>
           </a:xfrm>
           <a:prstGeom prst="rect">
@@ -14657,6 +14116,46 @@
           </a:p>
         </p:txBody>
       </p:sp>
+      <p:sp>
+        <p:nvSpPr>
+          <p:cNvPr id="4" name="TextBox 3">
+            <a:extLst>
+              <a:ext uri="{FF2B5EF4-FFF2-40B4-BE49-F238E27FC236}">
+                <a16:creationId xmlns:a16="http://schemas.microsoft.com/office/drawing/2014/main" id="{A8ED29C5-A058-7456-6CB4-7136BC0E5497}"/>
+              </a:ext>
+            </a:extLst>
+          </p:cNvPr>
+          <p:cNvSpPr txBox="1"/>
+          <p:nvPr/>
+        </p:nvSpPr>
+        <p:spPr>
+          <a:xfrm flipH="1">
+            <a:off x="2034838" y="438701"/>
+            <a:ext cx="825670" cy="276999"/>
+          </a:xfrm>
+          <a:prstGeom prst="rect">
+            <a:avLst/>
+          </a:prstGeom>
+          <a:noFill/>
+        </p:spPr>
+        <p:txBody>
+          <a:bodyPr wrap="square" rtlCol="0">
+            <a:spAutoFit/>
+          </a:bodyPr>
+          <a:lstStyle/>
+          <a:p>
+            <a:r>
+              <a:rPr lang="en-US" sz="1200" b="1" u="sng" dirty="0">
+                <a:latin typeface="Segoe UI Variable Small" pitchFamily="2" charset="0"/>
+              </a:rPr>
+              <a:t>Home</a:t>
+            </a:r>
+            <a:endParaRPr lang="en-PH" sz="1200" b="1" u="sng" dirty="0">
+              <a:latin typeface="Segoe UI Variable Small" pitchFamily="2" charset="0"/>
+            </a:endParaRPr>
+          </a:p>
+        </p:txBody>
+      </p:sp>
     </p:spTree>
     <p:extLst>
       <p:ext uri="{BB962C8B-B14F-4D97-AF65-F5344CB8AC3E}">
@@ -14700,7 +14199,7 @@
           <p:nvPr>
             <p:extLst>
               <p:ext uri="{D42A27DB-BD31-4B8C-83A1-F6EECF244321}">
-                <p14:modId xmlns:p14="http://schemas.microsoft.com/office/powerpoint/2010/main" val="1663676907"/>
+                <p14:modId xmlns:p14="http://schemas.microsoft.com/office/powerpoint/2010/main" val="2622337405"/>
               </p:ext>
             </p:extLst>
           </p:nvPr>

</xml_diff>